<commit_message>
add all the relevant files
</commit_message>
<xml_diff>
--- a/DEA_solution.pptx
+++ b/DEA_solution.pptx
@@ -5,7 +5,7 @@
     <p:sldMasterId id="2147483648" r:id="rId1"/>
   </p:sldMasterIdLst>
   <p:notesMasterIdLst>
-    <p:notesMasterId r:id="rId16"/>
+    <p:notesMasterId r:id="rId23"/>
   </p:notesMasterIdLst>
   <p:sldIdLst>
     <p:sldId id="256" r:id="rId2"/>
@@ -20,8 +20,15 @@
     <p:sldId id="265" r:id="rId11"/>
     <p:sldId id="266" r:id="rId12"/>
     <p:sldId id="267" r:id="rId13"/>
-    <p:sldId id="268" r:id="rId14"/>
-    <p:sldId id="269" r:id="rId15"/>
+    <p:sldId id="269" r:id="rId14"/>
+    <p:sldId id="270" r:id="rId15"/>
+    <p:sldId id="271" r:id="rId16"/>
+    <p:sldId id="272" r:id="rId17"/>
+    <p:sldId id="273" r:id="rId18"/>
+    <p:sldId id="274" r:id="rId19"/>
+    <p:sldId id="275" r:id="rId20"/>
+    <p:sldId id="276" r:id="rId21"/>
+    <p:sldId id="277" r:id="rId22"/>
   </p:sldIdLst>
   <p:sldSz cx="12192000" cy="6858000"/>
   <p:notesSz cx="6858000" cy="9144000"/>
@@ -210,7 +217,7 @@
           <a:p>
             <a:fld id="{BD1286F7-7B60-504A-AD35-40AFA39E89D0}" type="datetimeFigureOut">
               <a:rPr lang="en-NL" smtClean="0"/>
-              <a:t>25/04/2024</a:t>
+              <a:t>29/04/2024</a:t>
             </a:fld>
             <a:endParaRPr lang="en-NL"/>
           </a:p>
@@ -577,6 +584,797 @@
 </p:notes>
 </file>
 
+<file path=ppt/notesSlides/notesSlide10.xml><?xml version="1.0" encoding="utf-8"?>
+<p:notes xmlns:a="http://schemas.openxmlformats.org/drawingml/2006/main" xmlns:r="http://schemas.openxmlformats.org/officeDocument/2006/relationships" xmlns:p="http://schemas.openxmlformats.org/presentationml/2006/main">
+  <p:cSld>
+    <p:spTree>
+      <p:nvGrpSpPr>
+        <p:cNvPr id="1" name=""/>
+        <p:cNvGrpSpPr/>
+        <p:nvPr/>
+      </p:nvGrpSpPr>
+      <p:grpSpPr>
+        <a:xfrm>
+          <a:off x="0" y="0"/>
+          <a:ext cx="0" cy="0"/>
+          <a:chOff x="0" y="0"/>
+          <a:chExt cx="0" cy="0"/>
+        </a:xfrm>
+      </p:grpSpPr>
+      <p:sp>
+        <p:nvSpPr>
+          <p:cNvPr id="2" name="Slide Image Placeholder 1"/>
+          <p:cNvSpPr>
+            <a:spLocks noGrp="1" noRot="1" noChangeAspect="1"/>
+          </p:cNvSpPr>
+          <p:nvPr>
+            <p:ph type="sldImg"/>
+          </p:nvPr>
+        </p:nvSpPr>
+        <p:spPr/>
+      </p:sp>
+      <p:sp>
+        <p:nvSpPr>
+          <p:cNvPr id="3" name="Notes Placeholder 2"/>
+          <p:cNvSpPr>
+            <a:spLocks noGrp="1"/>
+          </p:cNvSpPr>
+          <p:nvPr>
+            <p:ph type="body" idx="1"/>
+          </p:nvPr>
+        </p:nvSpPr>
+        <p:spPr/>
+        <p:txBody>
+          <a:bodyPr/>
+          <a:lstStyle/>
+          <a:p>
+            <a:pPr marL="228600" indent="-228600">
+              <a:buAutoNum type="arabicPeriod"/>
+            </a:pPr>
+            <a:r>
+              <a:rPr lang="en-GB" dirty="0"/>
+              <a:t>W</a:t>
+            </a:r>
+            <a:r>
+              <a:rPr lang="en-NL" dirty="0"/>
+              <a:t>ithin the copy data activity, I make sure that the source dataset is the one that stores all the relevant files to merge and set the file path type to ’Wildcard file path’, to extract ALL of the files with the same format stored in that dataset. </a:t>
+            </a:r>
+          </a:p>
+          <a:p>
+            <a:pPr marL="228600" indent="-228600">
+              <a:buAutoNum type="arabicPeriod"/>
+            </a:pPr>
+            <a:r>
+              <a:rPr lang="en-NL" dirty="0"/>
+              <a:t>Then, I also ensure that the copy behaviour is set to ’Merge files’ because I want to merge all the extracted files together into one single data set, where I also set the sink dataset to be the right dataset which would store the merged table. </a:t>
+            </a:r>
+          </a:p>
+          <a:p>
+            <a:endParaRPr lang="en-NL" dirty="0"/>
+          </a:p>
+          <a:p>
+            <a:r>
+              <a:rPr lang="en-NL" dirty="0"/>
+              <a:t>Notably, this is the same for all file types. </a:t>
+            </a:r>
+          </a:p>
+          <a:p>
+            <a:endParaRPr lang="en-NL" dirty="0"/>
+          </a:p>
+        </p:txBody>
+      </p:sp>
+      <p:sp>
+        <p:nvSpPr>
+          <p:cNvPr id="4" name="Slide Number Placeholder 3"/>
+          <p:cNvSpPr>
+            <a:spLocks noGrp="1"/>
+          </p:cNvSpPr>
+          <p:nvPr>
+            <p:ph type="sldNum" sz="quarter" idx="5"/>
+          </p:nvPr>
+        </p:nvSpPr>
+        <p:spPr/>
+        <p:txBody>
+          <a:bodyPr/>
+          <a:lstStyle/>
+          <a:p>
+            <a:fld id="{C55E4414-EB4E-5644-A11D-E0224F375D2C}" type="slidenum">
+              <a:rPr lang="en-NL" smtClean="0"/>
+              <a:t>16</a:t>
+            </a:fld>
+            <a:endParaRPr lang="en-NL"/>
+          </a:p>
+        </p:txBody>
+      </p:sp>
+    </p:spTree>
+    <p:extLst>
+      <p:ext uri="{BB962C8B-B14F-4D97-AF65-F5344CB8AC3E}">
+        <p14:creationId xmlns:p14="http://schemas.microsoft.com/office/powerpoint/2010/main" val="1023102256"/>
+      </p:ext>
+    </p:extLst>
+  </p:cSld>
+  <p:clrMapOvr>
+    <a:masterClrMapping/>
+  </p:clrMapOvr>
+</p:notes>
+</file>
+
+<file path=ppt/notesSlides/notesSlide11.xml><?xml version="1.0" encoding="utf-8"?>
+<p:notes xmlns:a="http://schemas.openxmlformats.org/drawingml/2006/main" xmlns:r="http://schemas.openxmlformats.org/officeDocument/2006/relationships" xmlns:p="http://schemas.openxmlformats.org/presentationml/2006/main">
+  <p:cSld>
+    <p:spTree>
+      <p:nvGrpSpPr>
+        <p:cNvPr id="1" name=""/>
+        <p:cNvGrpSpPr/>
+        <p:nvPr/>
+      </p:nvGrpSpPr>
+      <p:grpSpPr>
+        <a:xfrm>
+          <a:off x="0" y="0"/>
+          <a:ext cx="0" cy="0"/>
+          <a:chOff x="0" y="0"/>
+          <a:chExt cx="0" cy="0"/>
+        </a:xfrm>
+      </p:grpSpPr>
+      <p:sp>
+        <p:nvSpPr>
+          <p:cNvPr id="2" name="Slide Image Placeholder 1"/>
+          <p:cNvSpPr>
+            <a:spLocks noGrp="1" noRot="1" noChangeAspect="1"/>
+          </p:cNvSpPr>
+          <p:nvPr>
+            <p:ph type="sldImg"/>
+          </p:nvPr>
+        </p:nvSpPr>
+        <p:spPr/>
+      </p:sp>
+      <p:sp>
+        <p:nvSpPr>
+          <p:cNvPr id="3" name="Notes Placeholder 2"/>
+          <p:cNvSpPr>
+            <a:spLocks noGrp="1"/>
+          </p:cNvSpPr>
+          <p:nvPr>
+            <p:ph type="body" idx="1"/>
+          </p:nvPr>
+        </p:nvSpPr>
+        <p:spPr/>
+        <p:txBody>
+          <a:bodyPr/>
+          <a:lstStyle/>
+          <a:p>
+            <a:r>
+              <a:rPr lang="en-NL" dirty="0"/>
+              <a:t>1. Within the data flow activity, the duplicates removal process is performed. </a:t>
+            </a:r>
+          </a:p>
+          <a:p>
+            <a:r>
+              <a:rPr lang="en-NL" dirty="0"/>
+              <a:t>2. There are 5 steps in this data flow activity: 1. Source, 2. Window, 3. Filter, 4. Select, 5. Sink</a:t>
+            </a:r>
+          </a:p>
+          <a:p>
+            <a:r>
+              <a:rPr lang="en-NL" dirty="0"/>
+              <a:t>3. In the first activity, is the source activity. In this activity, the source dataset is defined and extracted, selecting the relevant dataset that stores the mergedCSVtable after the copy data activity in the main pipeline. </a:t>
+            </a:r>
+          </a:p>
+          <a:p>
+            <a:r>
+              <a:rPr lang="en-NL" dirty="0"/>
+              <a:t>4. Notably, I also check the Validate schema tick box to ensure that the data flow will fail if the column defined in the projection does not match with the discovered schema of the source dataset. This will ensure that the incoming data matches a predefined schema before processing it further. </a:t>
+            </a:r>
+          </a:p>
+          <a:p>
+            <a:r>
+              <a:rPr lang="en-NL" dirty="0"/>
+              <a:t>5. So, the projection of the csv table should like the image above. </a:t>
+            </a:r>
+          </a:p>
+        </p:txBody>
+      </p:sp>
+      <p:sp>
+        <p:nvSpPr>
+          <p:cNvPr id="4" name="Slide Number Placeholder 3"/>
+          <p:cNvSpPr>
+            <a:spLocks noGrp="1"/>
+          </p:cNvSpPr>
+          <p:nvPr>
+            <p:ph type="sldNum" sz="quarter" idx="5"/>
+          </p:nvPr>
+        </p:nvSpPr>
+        <p:spPr/>
+        <p:txBody>
+          <a:bodyPr/>
+          <a:lstStyle/>
+          <a:p>
+            <a:fld id="{C55E4414-EB4E-5644-A11D-E0224F375D2C}" type="slidenum">
+              <a:rPr lang="en-NL" smtClean="0"/>
+              <a:t>17</a:t>
+            </a:fld>
+            <a:endParaRPr lang="en-NL"/>
+          </a:p>
+        </p:txBody>
+      </p:sp>
+    </p:spTree>
+    <p:extLst>
+      <p:ext uri="{BB962C8B-B14F-4D97-AF65-F5344CB8AC3E}">
+        <p14:creationId xmlns:p14="http://schemas.microsoft.com/office/powerpoint/2010/main" val="3578233096"/>
+      </p:ext>
+    </p:extLst>
+  </p:cSld>
+  <p:clrMapOvr>
+    <a:masterClrMapping/>
+  </p:clrMapOvr>
+</p:notes>
+</file>
+
+<file path=ppt/notesSlides/notesSlide12.xml><?xml version="1.0" encoding="utf-8"?>
+<p:notes xmlns:a="http://schemas.openxmlformats.org/drawingml/2006/main" xmlns:r="http://schemas.openxmlformats.org/officeDocument/2006/relationships" xmlns:p="http://schemas.openxmlformats.org/presentationml/2006/main">
+  <p:cSld>
+    <p:spTree>
+      <p:nvGrpSpPr>
+        <p:cNvPr id="1" name=""/>
+        <p:cNvGrpSpPr/>
+        <p:nvPr/>
+      </p:nvGrpSpPr>
+      <p:grpSpPr>
+        <a:xfrm>
+          <a:off x="0" y="0"/>
+          <a:ext cx="0" cy="0"/>
+          <a:chOff x="0" y="0"/>
+          <a:chExt cx="0" cy="0"/>
+        </a:xfrm>
+      </p:grpSpPr>
+      <p:sp>
+        <p:nvSpPr>
+          <p:cNvPr id="2" name="Slide Image Placeholder 1"/>
+          <p:cNvSpPr>
+            <a:spLocks noGrp="1" noRot="1" noChangeAspect="1"/>
+          </p:cNvSpPr>
+          <p:nvPr>
+            <p:ph type="sldImg"/>
+          </p:nvPr>
+        </p:nvSpPr>
+        <p:spPr/>
+      </p:sp>
+      <p:sp>
+        <p:nvSpPr>
+          <p:cNvPr id="3" name="Notes Placeholder 2"/>
+          <p:cNvSpPr>
+            <a:spLocks noGrp="1"/>
+          </p:cNvSpPr>
+          <p:nvPr>
+            <p:ph type="body" idx="1"/>
+          </p:nvPr>
+        </p:nvSpPr>
+        <p:spPr/>
+        <p:txBody>
+          <a:bodyPr/>
+          <a:lstStyle/>
+          <a:p>
+            <a:r>
+              <a:rPr lang="en-NL" dirty="0"/>
+              <a:t>1. Then, I use the window function activity in the data flow that would take in the data from source1, </a:t>
+            </a:r>
+          </a:p>
+          <a:p>
+            <a:r>
+              <a:rPr lang="en-NL" dirty="0"/>
+              <a:t>2. Select the relevant columns, sort based on all of the columns accordingly, </a:t>
+            </a:r>
+          </a:p>
+          <a:p>
+            <a:r>
+              <a:rPr lang="en-NL" dirty="0"/>
+              <a:t>3. Then create a new column in the dataset that utilize the rowNumber() expression. </a:t>
+            </a:r>
+          </a:p>
+          <a:p>
+            <a:r>
+              <a:rPr lang="en-NL" dirty="0"/>
+              <a:t>4. Where the rowNumber() function would specify for each distinct row, the row number. So if there are duplicates, the first occur</a:t>
+            </a:r>
+            <a:r>
+              <a:rPr lang="en-GB" dirty="0"/>
+              <a:t>r</a:t>
+            </a:r>
+            <a:r>
+              <a:rPr lang="en-NL" dirty="0"/>
+              <a:t>ence of that row would have row_number of 1, but the second occur</a:t>
+            </a:r>
+            <a:r>
+              <a:rPr lang="en-GB" dirty="0"/>
+              <a:t>r</a:t>
+            </a:r>
+            <a:r>
+              <a:rPr lang="en-NL" dirty="0"/>
+              <a:t>ence would have row_number of 2. </a:t>
+            </a:r>
+          </a:p>
+          <a:p>
+            <a:endParaRPr lang="en-NL" dirty="0"/>
+          </a:p>
+        </p:txBody>
+      </p:sp>
+      <p:sp>
+        <p:nvSpPr>
+          <p:cNvPr id="4" name="Slide Number Placeholder 3"/>
+          <p:cNvSpPr>
+            <a:spLocks noGrp="1"/>
+          </p:cNvSpPr>
+          <p:nvPr>
+            <p:ph type="sldNum" sz="quarter" idx="5"/>
+          </p:nvPr>
+        </p:nvSpPr>
+        <p:spPr/>
+        <p:txBody>
+          <a:bodyPr/>
+          <a:lstStyle/>
+          <a:p>
+            <a:fld id="{C55E4414-EB4E-5644-A11D-E0224F375D2C}" type="slidenum">
+              <a:rPr lang="en-NL" smtClean="0"/>
+              <a:t>18</a:t>
+            </a:fld>
+            <a:endParaRPr lang="en-NL"/>
+          </a:p>
+        </p:txBody>
+      </p:sp>
+    </p:spTree>
+    <p:extLst>
+      <p:ext uri="{BB962C8B-B14F-4D97-AF65-F5344CB8AC3E}">
+        <p14:creationId xmlns:p14="http://schemas.microsoft.com/office/powerpoint/2010/main" val="2089111041"/>
+      </p:ext>
+    </p:extLst>
+  </p:cSld>
+  <p:clrMapOvr>
+    <a:masterClrMapping/>
+  </p:clrMapOvr>
+</p:notes>
+</file>
+
+<file path=ppt/notesSlides/notesSlide13.xml><?xml version="1.0" encoding="utf-8"?>
+<p:notes xmlns:a="http://schemas.openxmlformats.org/drawingml/2006/main" xmlns:r="http://schemas.openxmlformats.org/officeDocument/2006/relationships" xmlns:p="http://schemas.openxmlformats.org/presentationml/2006/main">
+  <p:cSld>
+    <p:spTree>
+      <p:nvGrpSpPr>
+        <p:cNvPr id="1" name=""/>
+        <p:cNvGrpSpPr/>
+        <p:nvPr/>
+      </p:nvGrpSpPr>
+      <p:grpSpPr>
+        <a:xfrm>
+          <a:off x="0" y="0"/>
+          <a:ext cx="0" cy="0"/>
+          <a:chOff x="0" y="0"/>
+          <a:chExt cx="0" cy="0"/>
+        </a:xfrm>
+      </p:grpSpPr>
+      <p:sp>
+        <p:nvSpPr>
+          <p:cNvPr id="2" name="Slide Image Placeholder 1"/>
+          <p:cNvSpPr>
+            <a:spLocks noGrp="1" noRot="1" noChangeAspect="1"/>
+          </p:cNvSpPr>
+          <p:nvPr>
+            <p:ph type="sldImg"/>
+          </p:nvPr>
+        </p:nvSpPr>
+        <p:spPr/>
+      </p:sp>
+      <p:sp>
+        <p:nvSpPr>
+          <p:cNvPr id="3" name="Notes Placeholder 2"/>
+          <p:cNvSpPr>
+            <a:spLocks noGrp="1"/>
+          </p:cNvSpPr>
+          <p:nvPr>
+            <p:ph type="body" idx="1"/>
+          </p:nvPr>
+        </p:nvSpPr>
+        <p:spPr/>
+        <p:txBody>
+          <a:bodyPr/>
+          <a:lstStyle/>
+          <a:p>
+            <a:pPr marL="228600" indent="-228600">
+              <a:buAutoNum type="arabicPeriod"/>
+            </a:pPr>
+            <a:r>
+              <a:rPr lang="en-NL" dirty="0"/>
+              <a:t>Then, I filter out the duplicate rows by keeping only those observations in which row_number == 1 so that the first occur</a:t>
+            </a:r>
+            <a:r>
+              <a:rPr lang="en-GB" dirty="0"/>
+              <a:t>r</a:t>
+            </a:r>
+            <a:r>
+              <a:rPr lang="en-NL" dirty="0"/>
+              <a:t>ence of each row are kept only. </a:t>
+            </a:r>
+          </a:p>
+          <a:p>
+            <a:pPr marL="228600" indent="-228600">
+              <a:buAutoNum type="arabicPeriod"/>
+            </a:pPr>
+            <a:endParaRPr lang="en-NL" dirty="0"/>
+          </a:p>
+        </p:txBody>
+      </p:sp>
+      <p:sp>
+        <p:nvSpPr>
+          <p:cNvPr id="4" name="Slide Number Placeholder 3"/>
+          <p:cNvSpPr>
+            <a:spLocks noGrp="1"/>
+          </p:cNvSpPr>
+          <p:nvPr>
+            <p:ph type="sldNum" sz="quarter" idx="5"/>
+          </p:nvPr>
+        </p:nvSpPr>
+        <p:spPr/>
+        <p:txBody>
+          <a:bodyPr/>
+          <a:lstStyle/>
+          <a:p>
+            <a:fld id="{C55E4414-EB4E-5644-A11D-E0224F375D2C}" type="slidenum">
+              <a:rPr lang="en-NL" smtClean="0"/>
+              <a:t>19</a:t>
+            </a:fld>
+            <a:endParaRPr lang="en-NL"/>
+          </a:p>
+        </p:txBody>
+      </p:sp>
+    </p:spTree>
+    <p:extLst>
+      <p:ext uri="{BB962C8B-B14F-4D97-AF65-F5344CB8AC3E}">
+        <p14:creationId xmlns:p14="http://schemas.microsoft.com/office/powerpoint/2010/main" val="3109256488"/>
+      </p:ext>
+    </p:extLst>
+  </p:cSld>
+  <p:clrMapOvr>
+    <a:masterClrMapping/>
+  </p:clrMapOvr>
+</p:notes>
+</file>
+
+<file path=ppt/notesSlides/notesSlide14.xml><?xml version="1.0" encoding="utf-8"?>
+<p:notes xmlns:a="http://schemas.openxmlformats.org/drawingml/2006/main" xmlns:r="http://schemas.openxmlformats.org/officeDocument/2006/relationships" xmlns:p="http://schemas.openxmlformats.org/presentationml/2006/main">
+  <p:cSld>
+    <p:spTree>
+      <p:nvGrpSpPr>
+        <p:cNvPr id="1" name=""/>
+        <p:cNvGrpSpPr/>
+        <p:nvPr/>
+      </p:nvGrpSpPr>
+      <p:grpSpPr>
+        <a:xfrm>
+          <a:off x="0" y="0"/>
+          <a:ext cx="0" cy="0"/>
+          <a:chOff x="0" y="0"/>
+          <a:chExt cx="0" cy="0"/>
+        </a:xfrm>
+      </p:grpSpPr>
+      <p:sp>
+        <p:nvSpPr>
+          <p:cNvPr id="2" name="Slide Image Placeholder 1"/>
+          <p:cNvSpPr>
+            <a:spLocks noGrp="1" noRot="1" noChangeAspect="1"/>
+          </p:cNvSpPr>
+          <p:nvPr>
+            <p:ph type="sldImg"/>
+          </p:nvPr>
+        </p:nvSpPr>
+        <p:spPr/>
+      </p:sp>
+      <p:sp>
+        <p:nvSpPr>
+          <p:cNvPr id="3" name="Notes Placeholder 2"/>
+          <p:cNvSpPr>
+            <a:spLocks noGrp="1"/>
+          </p:cNvSpPr>
+          <p:nvPr>
+            <p:ph type="body" idx="1"/>
+          </p:nvPr>
+        </p:nvSpPr>
+        <p:spPr/>
+        <p:txBody>
+          <a:bodyPr/>
+          <a:lstStyle/>
+          <a:p>
+            <a:pPr marL="228600" indent="-228600">
+              <a:buAutoNum type="arabicPeriod"/>
+            </a:pPr>
+            <a:r>
+              <a:rPr lang="nl-NL" dirty="0" err="1"/>
+              <a:t>Subsequently</a:t>
+            </a:r>
+            <a:r>
+              <a:rPr lang="nl-NL" dirty="0"/>
+              <a:t>, </a:t>
+            </a:r>
+            <a:r>
+              <a:rPr lang="nl-NL" dirty="0" err="1"/>
+              <a:t>because</a:t>
+            </a:r>
+            <a:r>
+              <a:rPr lang="nl-NL" dirty="0"/>
+              <a:t> we are </a:t>
+            </a:r>
+            <a:r>
+              <a:rPr lang="nl-NL" dirty="0" err="1"/>
+              <a:t>not</a:t>
+            </a:r>
+            <a:r>
+              <a:rPr lang="nl-NL" dirty="0"/>
+              <a:t> </a:t>
+            </a:r>
+            <a:r>
+              <a:rPr lang="nl-NL" dirty="0" err="1"/>
+              <a:t>interested</a:t>
+            </a:r>
+            <a:r>
+              <a:rPr lang="nl-NL" dirty="0"/>
+              <a:t> in </a:t>
+            </a:r>
+            <a:r>
+              <a:rPr lang="nl-NL" dirty="0" err="1"/>
+              <a:t>the</a:t>
+            </a:r>
+            <a:r>
+              <a:rPr lang="nl-NL" dirty="0"/>
+              <a:t> </a:t>
+            </a:r>
+            <a:r>
+              <a:rPr lang="nl-NL" dirty="0" err="1"/>
+              <a:t>row_number</a:t>
+            </a:r>
+            <a:r>
+              <a:rPr lang="nl-NL" dirty="0"/>
+              <a:t> column, I </a:t>
+            </a:r>
+            <a:r>
+              <a:rPr lang="nl-NL" dirty="0" err="1"/>
+              <a:t>use</a:t>
+            </a:r>
+            <a:r>
+              <a:rPr lang="nl-NL" dirty="0"/>
+              <a:t> </a:t>
+            </a:r>
+            <a:r>
+              <a:rPr lang="nl-NL" dirty="0" err="1"/>
+              <a:t>the</a:t>
+            </a:r>
+            <a:r>
+              <a:rPr lang="nl-NL" dirty="0"/>
+              <a:t> select </a:t>
+            </a:r>
+            <a:r>
+              <a:rPr lang="nl-NL" dirty="0" err="1"/>
+              <a:t>activity</a:t>
+            </a:r>
+            <a:r>
+              <a:rPr lang="nl-NL" dirty="0"/>
+              <a:t> </a:t>
+            </a:r>
+            <a:r>
+              <a:rPr lang="nl-NL" dirty="0" err="1"/>
+              <a:t>to</a:t>
+            </a:r>
+            <a:r>
+              <a:rPr lang="nl-NL" dirty="0"/>
+              <a:t> select </a:t>
+            </a:r>
+            <a:r>
+              <a:rPr lang="nl-NL" dirty="0" err="1"/>
+              <a:t>the</a:t>
+            </a:r>
+            <a:r>
+              <a:rPr lang="nl-NL" dirty="0"/>
+              <a:t> relevant columns </a:t>
+            </a:r>
+            <a:r>
+              <a:rPr lang="nl-NL" dirty="0" err="1"/>
+              <a:t>from</a:t>
+            </a:r>
+            <a:r>
+              <a:rPr lang="nl-NL" dirty="0"/>
+              <a:t> </a:t>
+            </a:r>
+            <a:r>
+              <a:rPr lang="nl-NL" dirty="0" err="1"/>
+              <a:t>the</a:t>
+            </a:r>
+            <a:r>
+              <a:rPr lang="nl-NL" dirty="0"/>
+              <a:t> </a:t>
+            </a:r>
+            <a:r>
+              <a:rPr lang="nl-NL" dirty="0" err="1"/>
+              <a:t>filtered</a:t>
+            </a:r>
+            <a:r>
+              <a:rPr lang="nl-NL" dirty="0"/>
+              <a:t> dataframe, </a:t>
+            </a:r>
+            <a:r>
+              <a:rPr lang="nl-NL" dirty="0" err="1"/>
+              <a:t>excluding</a:t>
+            </a:r>
+            <a:r>
+              <a:rPr lang="nl-NL" dirty="0"/>
+              <a:t> </a:t>
+            </a:r>
+            <a:r>
+              <a:rPr lang="nl-NL" dirty="0" err="1"/>
+              <a:t>the</a:t>
+            </a:r>
+            <a:r>
+              <a:rPr lang="nl-NL" dirty="0"/>
+              <a:t> </a:t>
+            </a:r>
+            <a:r>
+              <a:rPr lang="nl-NL" dirty="0" err="1"/>
+              <a:t>row_number</a:t>
+            </a:r>
+            <a:r>
+              <a:rPr lang="nl-NL" dirty="0"/>
+              <a:t> column, </a:t>
+            </a:r>
+            <a:r>
+              <a:rPr lang="nl-NL" dirty="0" err="1"/>
+              <a:t>by</a:t>
+            </a:r>
+            <a:r>
+              <a:rPr lang="nl-NL" dirty="0"/>
+              <a:t> </a:t>
+            </a:r>
+            <a:r>
+              <a:rPr lang="nl-NL" dirty="0" err="1"/>
+              <a:t>clicking</a:t>
+            </a:r>
+            <a:r>
+              <a:rPr lang="nl-NL" dirty="0"/>
+              <a:t> on </a:t>
+            </a:r>
+            <a:r>
+              <a:rPr lang="nl-NL" dirty="0" err="1"/>
+              <a:t>the</a:t>
+            </a:r>
+            <a:r>
+              <a:rPr lang="nl-NL" dirty="0"/>
+              <a:t> bin icon. </a:t>
+            </a:r>
+            <a:endParaRPr lang="en-NL" dirty="0"/>
+          </a:p>
+          <a:p>
+            <a:endParaRPr lang="en-NL" dirty="0"/>
+          </a:p>
+        </p:txBody>
+      </p:sp>
+      <p:sp>
+        <p:nvSpPr>
+          <p:cNvPr id="4" name="Slide Number Placeholder 3"/>
+          <p:cNvSpPr>
+            <a:spLocks noGrp="1"/>
+          </p:cNvSpPr>
+          <p:nvPr>
+            <p:ph type="sldNum" sz="quarter" idx="5"/>
+          </p:nvPr>
+        </p:nvSpPr>
+        <p:spPr/>
+        <p:txBody>
+          <a:bodyPr/>
+          <a:lstStyle/>
+          <a:p>
+            <a:fld id="{C55E4414-EB4E-5644-A11D-E0224F375D2C}" type="slidenum">
+              <a:rPr lang="en-NL" smtClean="0"/>
+              <a:t>20</a:t>
+            </a:fld>
+            <a:endParaRPr lang="en-NL"/>
+          </a:p>
+        </p:txBody>
+      </p:sp>
+    </p:spTree>
+    <p:extLst>
+      <p:ext uri="{BB962C8B-B14F-4D97-AF65-F5344CB8AC3E}">
+        <p14:creationId xmlns:p14="http://schemas.microsoft.com/office/powerpoint/2010/main" val="2465695513"/>
+      </p:ext>
+    </p:extLst>
+  </p:cSld>
+  <p:clrMapOvr>
+    <a:masterClrMapping/>
+  </p:clrMapOvr>
+</p:notes>
+</file>
+
+<file path=ppt/notesSlides/notesSlide15.xml><?xml version="1.0" encoding="utf-8"?>
+<p:notes xmlns:a="http://schemas.openxmlformats.org/drawingml/2006/main" xmlns:r="http://schemas.openxmlformats.org/officeDocument/2006/relationships" xmlns:p="http://schemas.openxmlformats.org/presentationml/2006/main">
+  <p:cSld>
+    <p:spTree>
+      <p:nvGrpSpPr>
+        <p:cNvPr id="1" name=""/>
+        <p:cNvGrpSpPr/>
+        <p:nvPr/>
+      </p:nvGrpSpPr>
+      <p:grpSpPr>
+        <a:xfrm>
+          <a:off x="0" y="0"/>
+          <a:ext cx="0" cy="0"/>
+          <a:chOff x="0" y="0"/>
+          <a:chExt cx="0" cy="0"/>
+        </a:xfrm>
+      </p:grpSpPr>
+      <p:sp>
+        <p:nvSpPr>
+          <p:cNvPr id="2" name="Slide Image Placeholder 1"/>
+          <p:cNvSpPr>
+            <a:spLocks noGrp="1" noRot="1" noChangeAspect="1"/>
+          </p:cNvSpPr>
+          <p:nvPr>
+            <p:ph type="sldImg"/>
+          </p:nvPr>
+        </p:nvSpPr>
+        <p:spPr/>
+      </p:sp>
+      <p:sp>
+        <p:nvSpPr>
+          <p:cNvPr id="3" name="Notes Placeholder 2"/>
+          <p:cNvSpPr>
+            <a:spLocks noGrp="1"/>
+          </p:cNvSpPr>
+          <p:nvPr>
+            <p:ph type="body" idx="1"/>
+          </p:nvPr>
+        </p:nvSpPr>
+        <p:spPr/>
+        <p:txBody>
+          <a:bodyPr/>
+          <a:lstStyle/>
+          <a:p>
+            <a:r>
+              <a:rPr lang="en-NL" dirty="0"/>
+              <a:t>1. Ultimately, I complete the whole data flow activity by sinking/loading the transformed dataset onto the appropriate table in the SQL database using the relevant SQL server that is connected to the correct linked servce. </a:t>
+            </a:r>
+          </a:p>
+        </p:txBody>
+      </p:sp>
+      <p:sp>
+        <p:nvSpPr>
+          <p:cNvPr id="4" name="Slide Number Placeholder 3"/>
+          <p:cNvSpPr>
+            <a:spLocks noGrp="1"/>
+          </p:cNvSpPr>
+          <p:nvPr>
+            <p:ph type="sldNum" sz="quarter" idx="5"/>
+          </p:nvPr>
+        </p:nvSpPr>
+        <p:spPr/>
+        <p:txBody>
+          <a:bodyPr/>
+          <a:lstStyle/>
+          <a:p>
+            <a:fld id="{C55E4414-EB4E-5644-A11D-E0224F375D2C}" type="slidenum">
+              <a:rPr lang="en-NL" smtClean="0"/>
+              <a:t>21</a:t>
+            </a:fld>
+            <a:endParaRPr lang="en-NL"/>
+          </a:p>
+        </p:txBody>
+      </p:sp>
+    </p:spTree>
+    <p:extLst>
+      <p:ext uri="{BB962C8B-B14F-4D97-AF65-F5344CB8AC3E}">
+        <p14:creationId xmlns:p14="http://schemas.microsoft.com/office/powerpoint/2010/main" val="2468434614"/>
+      </p:ext>
+    </p:extLst>
+  </p:cSld>
+  <p:clrMapOvr>
+    <a:masterClrMapping/>
+  </p:clrMapOvr>
+</p:notes>
+</file>
+
 <file path=ppt/notesSlides/notesSlide2.xml><?xml version="1.0" encoding="utf-8"?>
 <p:notes xmlns:a="http://schemas.openxmlformats.org/drawingml/2006/main" xmlns:r="http://schemas.openxmlformats.org/officeDocument/2006/relationships" xmlns:p="http://schemas.openxmlformats.org/presentationml/2006/main">
   <p:cSld>
@@ -1199,6 +1997,59 @@
           <a:bodyPr/>
           <a:lstStyle/>
           <a:p>
+            <a:r>
+              <a:rPr lang="en-NL" dirty="0"/>
+              <a:t>Without cleaning just yet:</a:t>
+            </a:r>
+          </a:p>
+          <a:p>
+            <a:r>
+              <a:rPr lang="en-NL" dirty="0"/>
+              <a:t>1. Create a dataset called “csvFiles” that has a connection to the container stored in the data lake with the appropriate linked service</a:t>
+            </a:r>
+          </a:p>
+          <a:p>
+            <a:r>
+              <a:rPr lang="en-NL" dirty="0"/>
+              <a:t>2. Create a new pipeline where the first step would be a “Copy data” activity named “Extract and Merge csv Tables” that would extract all the relevant csv files that was loaded into the csvFiles data set, merge them, and sink it to a table in SQL Database. This means that I have to create a new empty table first in SQL Database that will store the results of the transformed csv table, json table, and avro table. </a:t>
+            </a:r>
+          </a:p>
+          <a:p>
+            <a:endParaRPr lang="en-NL" dirty="0"/>
+          </a:p>
+          <a:p>
+            <a:endParaRPr lang="en-NL" dirty="0"/>
+          </a:p>
+          <a:p>
+            <a:endParaRPr lang="en-NL" dirty="0"/>
+          </a:p>
+          <a:p>
+            <a:r>
+              <a:rPr lang="en-NL" dirty="0"/>
+              <a:t>Why use copy data activities? </a:t>
+            </a:r>
+          </a:p>
+          <a:p>
+            <a:pPr marL="171450" indent="-171450">
+              <a:buFontTx/>
+              <a:buChar char="-"/>
+            </a:pPr>
+            <a:r>
+              <a:rPr lang="en-GB" dirty="0"/>
+              <a:t>I</a:t>
+            </a:r>
+            <a:r>
+              <a:rPr lang="en-NL" dirty="0"/>
+              <a:t>t is designed for data movement between different data stores, making it suitable for ingesting data files from a dataset and store it in a target data set.</a:t>
+            </a:r>
+          </a:p>
+          <a:p>
+            <a:endParaRPr lang="en-NL" dirty="0"/>
+          </a:p>
+          <a:p>
+            <a:endParaRPr lang="en-NL" dirty="0"/>
+          </a:p>
+          <a:p>
             <a:endParaRPr lang="en-NL" dirty="0"/>
           </a:p>
           <a:p>
@@ -1232,7 +2083,7 @@
     </p:spTree>
     <p:extLst>
       <p:ext uri="{BB962C8B-B14F-4D97-AF65-F5344CB8AC3E}">
-        <p14:creationId xmlns:p14="http://schemas.microsoft.com/office/powerpoint/2010/main" val="143888261"/>
+        <p14:creationId xmlns:p14="http://schemas.microsoft.com/office/powerpoint/2010/main" val="2902180872"/>
       </p:ext>
     </p:extLst>
   </p:cSld>
@@ -1286,62 +2137,6 @@
           <a:bodyPr/>
           <a:lstStyle/>
           <a:p>
-            <a:r>
-              <a:rPr lang="en-NL" dirty="0"/>
-              <a:t>Without cleaning just yet:</a:t>
-            </a:r>
-          </a:p>
-          <a:p>
-            <a:r>
-              <a:rPr lang="en-NL" dirty="0"/>
-              <a:t>1. Create a dataset called “csvFiles” that has a connection to the container stored in the data lake with the appropriate linked service</a:t>
-            </a:r>
-          </a:p>
-          <a:p>
-            <a:r>
-              <a:rPr lang="en-NL" dirty="0"/>
-              <a:t>2. Create a new pipeline where the first step would be a “Copy data” activity named “Extract and Merge csv Tables” that would extract all the relevant csv files that was loaded into the csvFiles data set, merge them, and sink it to a table in SQL Database. This means that I have to create a new empty table first in SQL Database that will store the results of the transformed csv table, json table, and avro table. </a:t>
-            </a:r>
-          </a:p>
-          <a:p>
-            <a:endParaRPr lang="en-NL" dirty="0"/>
-          </a:p>
-          <a:p>
-            <a:endParaRPr lang="en-NL" dirty="0"/>
-          </a:p>
-          <a:p>
-            <a:endParaRPr lang="en-NL" dirty="0"/>
-          </a:p>
-          <a:p>
-            <a:r>
-              <a:rPr lang="en-NL" dirty="0"/>
-              <a:t>Why use copy data activities? </a:t>
-            </a:r>
-          </a:p>
-          <a:p>
-            <a:pPr marL="171450" indent="-171450">
-              <a:buFontTx/>
-              <a:buChar char="-"/>
-            </a:pPr>
-            <a:r>
-              <a:rPr lang="en-GB" dirty="0"/>
-              <a:t>I</a:t>
-            </a:r>
-            <a:r>
-              <a:rPr lang="en-NL" dirty="0"/>
-              <a:t>t is designed for data movement between different data stores, making it suitable for ingesting data files from a dataset and store it in a target data set.</a:t>
-            </a:r>
-          </a:p>
-          <a:p>
-            <a:endParaRPr lang="en-NL" dirty="0"/>
-          </a:p>
-          <a:p>
-            <a:endParaRPr lang="en-NL" dirty="0"/>
-          </a:p>
-          <a:p>
-            <a:endParaRPr lang="en-NL" dirty="0"/>
-          </a:p>
-          <a:p>
             <a:endParaRPr lang="en-NL" dirty="0"/>
           </a:p>
         </p:txBody>
@@ -1372,7 +2167,130 @@
     </p:spTree>
     <p:extLst>
       <p:ext uri="{BB962C8B-B14F-4D97-AF65-F5344CB8AC3E}">
-        <p14:creationId xmlns:p14="http://schemas.microsoft.com/office/powerpoint/2010/main" val="2902180872"/>
+        <p14:creationId xmlns:p14="http://schemas.microsoft.com/office/powerpoint/2010/main" val="3015896750"/>
+      </p:ext>
+    </p:extLst>
+  </p:cSld>
+  <p:clrMapOvr>
+    <a:masterClrMapping/>
+  </p:clrMapOvr>
+</p:notes>
+</file>
+
+<file path=ppt/notesSlides/notesSlide9.xml><?xml version="1.0" encoding="utf-8"?>
+<p:notes xmlns:a="http://schemas.openxmlformats.org/drawingml/2006/main" xmlns:r="http://schemas.openxmlformats.org/officeDocument/2006/relationships" xmlns:p="http://schemas.openxmlformats.org/presentationml/2006/main">
+  <p:cSld>
+    <p:spTree>
+      <p:nvGrpSpPr>
+        <p:cNvPr id="1" name=""/>
+        <p:cNvGrpSpPr/>
+        <p:nvPr/>
+      </p:nvGrpSpPr>
+      <p:grpSpPr>
+        <a:xfrm>
+          <a:off x="0" y="0"/>
+          <a:ext cx="0" cy="0"/>
+          <a:chOff x="0" y="0"/>
+          <a:chExt cx="0" cy="0"/>
+        </a:xfrm>
+      </p:grpSpPr>
+      <p:sp>
+        <p:nvSpPr>
+          <p:cNvPr id="2" name="Slide Image Placeholder 1"/>
+          <p:cNvSpPr>
+            <a:spLocks noGrp="1" noRot="1" noChangeAspect="1"/>
+          </p:cNvSpPr>
+          <p:nvPr>
+            <p:ph type="sldImg"/>
+          </p:nvPr>
+        </p:nvSpPr>
+        <p:spPr/>
+      </p:sp>
+      <p:sp>
+        <p:nvSpPr>
+          <p:cNvPr id="3" name="Notes Placeholder 2"/>
+          <p:cNvSpPr>
+            <a:spLocks noGrp="1"/>
+          </p:cNvSpPr>
+          <p:nvPr>
+            <p:ph type="body" idx="1"/>
+          </p:nvPr>
+        </p:nvSpPr>
+        <p:spPr/>
+        <p:txBody>
+          <a:bodyPr/>
+          <a:lstStyle/>
+          <a:p>
+            <a:r>
+              <a:rPr lang="en-NL" dirty="0"/>
+              <a:t>For all of the merged files, I create the following ETL pipeline</a:t>
+            </a:r>
+          </a:p>
+          <a:p>
+            <a:r>
+              <a:rPr lang="en-NL" dirty="0"/>
+              <a:t>1. Copy data activity (for extracting all the files of the same type, merge them together into one single table)</a:t>
+            </a:r>
+          </a:p>
+          <a:p>
+            <a:r>
+              <a:rPr lang="en-NL" dirty="0"/>
+              <a:t>2. Data flow activity (extract the merged table of one file format, perform the transformation, and load the transformed data table onto a specific table in the relevant SQL database)</a:t>
+            </a:r>
+          </a:p>
+          <a:p>
+            <a:endParaRPr lang="en-NL" dirty="0"/>
+          </a:p>
+          <a:p>
+            <a:endParaRPr lang="en-NL" dirty="0"/>
+          </a:p>
+          <a:p>
+            <a:endParaRPr lang="en-NL" dirty="0"/>
+          </a:p>
+          <a:p>
+            <a:endParaRPr lang="en-NL" dirty="0"/>
+          </a:p>
+          <a:p>
+            <a:endParaRPr lang="en-NL" dirty="0"/>
+          </a:p>
+          <a:p>
+            <a:endParaRPr lang="en-NL" dirty="0"/>
+          </a:p>
+          <a:p>
+            <a:endParaRPr lang="en-NL" dirty="0"/>
+          </a:p>
+          <a:p>
+            <a:endParaRPr lang="en-NL" dirty="0"/>
+          </a:p>
+        </p:txBody>
+      </p:sp>
+      <p:sp>
+        <p:nvSpPr>
+          <p:cNvPr id="4" name="Slide Number Placeholder 3"/>
+          <p:cNvSpPr>
+            <a:spLocks noGrp="1"/>
+          </p:cNvSpPr>
+          <p:nvPr>
+            <p:ph type="sldNum" sz="quarter" idx="5"/>
+          </p:nvPr>
+        </p:nvSpPr>
+        <p:spPr/>
+        <p:txBody>
+          <a:bodyPr/>
+          <a:lstStyle/>
+          <a:p>
+            <a:fld id="{C55E4414-EB4E-5644-A11D-E0224F375D2C}" type="slidenum">
+              <a:rPr lang="en-NL" smtClean="0"/>
+              <a:t>15</a:t>
+            </a:fld>
+            <a:endParaRPr lang="en-NL"/>
+          </a:p>
+        </p:txBody>
+      </p:sp>
+    </p:spTree>
+    <p:extLst>
+      <p:ext uri="{BB962C8B-B14F-4D97-AF65-F5344CB8AC3E}">
+        <p14:creationId xmlns:p14="http://schemas.microsoft.com/office/powerpoint/2010/main" val="1742621917"/>
       </p:ext>
     </p:extLst>
   </p:cSld>
@@ -1531,7 +2449,7 @@
           <a:p>
             <a:fld id="{E9623B3B-8358-DB47-8619-EAC663A38D2D}" type="datetimeFigureOut">
               <a:rPr lang="en-NL" smtClean="0"/>
-              <a:t>25/04/2024</a:t>
+              <a:t>29/04/2024</a:t>
             </a:fld>
             <a:endParaRPr lang="en-NL"/>
           </a:p>
@@ -1731,7 +2649,7 @@
           <a:p>
             <a:fld id="{E9623B3B-8358-DB47-8619-EAC663A38D2D}" type="datetimeFigureOut">
               <a:rPr lang="en-NL" smtClean="0"/>
-              <a:t>25/04/2024</a:t>
+              <a:t>29/04/2024</a:t>
             </a:fld>
             <a:endParaRPr lang="en-NL"/>
           </a:p>
@@ -1941,7 +2859,7 @@
           <a:p>
             <a:fld id="{E9623B3B-8358-DB47-8619-EAC663A38D2D}" type="datetimeFigureOut">
               <a:rPr lang="en-NL" smtClean="0"/>
-              <a:t>25/04/2024</a:t>
+              <a:t>29/04/2024</a:t>
             </a:fld>
             <a:endParaRPr lang="en-NL"/>
           </a:p>
@@ -2141,7 +3059,7 @@
           <a:p>
             <a:fld id="{E9623B3B-8358-DB47-8619-EAC663A38D2D}" type="datetimeFigureOut">
               <a:rPr lang="en-NL" smtClean="0"/>
-              <a:t>25/04/2024</a:t>
+              <a:t>29/04/2024</a:t>
             </a:fld>
             <a:endParaRPr lang="en-NL"/>
           </a:p>
@@ -2417,7 +3335,7 @@
           <a:p>
             <a:fld id="{E9623B3B-8358-DB47-8619-EAC663A38D2D}" type="datetimeFigureOut">
               <a:rPr lang="en-NL" smtClean="0"/>
-              <a:t>25/04/2024</a:t>
+              <a:t>29/04/2024</a:t>
             </a:fld>
             <a:endParaRPr lang="en-NL"/>
           </a:p>
@@ -2685,7 +3603,7 @@
           <a:p>
             <a:fld id="{E9623B3B-8358-DB47-8619-EAC663A38D2D}" type="datetimeFigureOut">
               <a:rPr lang="en-NL" smtClean="0"/>
-              <a:t>25/04/2024</a:t>
+              <a:t>29/04/2024</a:t>
             </a:fld>
             <a:endParaRPr lang="en-NL"/>
           </a:p>
@@ -3100,7 +4018,7 @@
           <a:p>
             <a:fld id="{E9623B3B-8358-DB47-8619-EAC663A38D2D}" type="datetimeFigureOut">
               <a:rPr lang="en-NL" smtClean="0"/>
-              <a:t>25/04/2024</a:t>
+              <a:t>29/04/2024</a:t>
             </a:fld>
             <a:endParaRPr lang="en-NL"/>
           </a:p>
@@ -3242,7 +4160,7 @@
           <a:p>
             <a:fld id="{E9623B3B-8358-DB47-8619-EAC663A38D2D}" type="datetimeFigureOut">
               <a:rPr lang="en-NL" smtClean="0"/>
-              <a:t>25/04/2024</a:t>
+              <a:t>29/04/2024</a:t>
             </a:fld>
             <a:endParaRPr lang="en-NL"/>
           </a:p>
@@ -3355,7 +4273,7 @@
           <a:p>
             <a:fld id="{E9623B3B-8358-DB47-8619-EAC663A38D2D}" type="datetimeFigureOut">
               <a:rPr lang="en-NL" smtClean="0"/>
-              <a:t>25/04/2024</a:t>
+              <a:t>29/04/2024</a:t>
             </a:fld>
             <a:endParaRPr lang="en-NL"/>
           </a:p>
@@ -3668,7 +4586,7 @@
           <a:p>
             <a:fld id="{E9623B3B-8358-DB47-8619-EAC663A38D2D}" type="datetimeFigureOut">
               <a:rPr lang="en-NL" smtClean="0"/>
-              <a:t>25/04/2024</a:t>
+              <a:t>29/04/2024</a:t>
             </a:fld>
             <a:endParaRPr lang="en-NL"/>
           </a:p>
@@ -3957,7 +4875,7 @@
           <a:p>
             <a:fld id="{E9623B3B-8358-DB47-8619-EAC663A38D2D}" type="datetimeFigureOut">
               <a:rPr lang="en-NL" smtClean="0"/>
-              <a:t>25/04/2024</a:t>
+              <a:t>29/04/2024</a:t>
             </a:fld>
             <a:endParaRPr lang="en-NL"/>
           </a:p>
@@ -4200,7 +5118,7 @@
           <a:p>
             <a:fld id="{E9623B3B-8358-DB47-8619-EAC663A38D2D}" type="datetimeFigureOut">
               <a:rPr lang="en-NL" smtClean="0"/>
-              <a:t>25/04/2024</a:t>
+              <a:t>29/04/2024</a:t>
             </a:fld>
             <a:endParaRPr lang="en-NL"/>
           </a:p>
@@ -4891,211 +5809,40 @@
           <a:chExt cx="0" cy="0"/>
         </a:xfrm>
       </p:grpSpPr>
-      <p:sp>
-        <p:nvSpPr>
-          <p:cNvPr id="2" name="TextBox 1">
-            <a:extLst>
-              <a:ext uri="{FF2B5EF4-FFF2-40B4-BE49-F238E27FC236}">
-                <a16:creationId xmlns:a16="http://schemas.microsoft.com/office/drawing/2014/main" id="{A5304B5A-7A1D-29B5-9BA5-289C433B2E6B}"/>
-              </a:ext>
-            </a:extLst>
-          </p:cNvPr>
-          <p:cNvSpPr txBox="1"/>
+      <p:pic>
+        <p:nvPicPr>
+          <p:cNvPr id="12" name="Picture 11">
+            <a:extLst>
+              <a:ext uri="{FF2B5EF4-FFF2-40B4-BE49-F238E27FC236}">
+                <a16:creationId xmlns:a16="http://schemas.microsoft.com/office/drawing/2014/main" id="{52A8AEEA-F2EC-E0A2-7BC2-3360DCBF6BEE}"/>
+              </a:ext>
+            </a:extLst>
+          </p:cNvPr>
+          <p:cNvPicPr>
+            <a:picLocks noChangeAspect="1"/>
+          </p:cNvPicPr>
           <p:nvPr/>
-        </p:nvSpPr>
+        </p:nvPicPr>
+        <p:blipFill>
+          <a:blip r:embed="rId3"/>
+          <a:stretch>
+            <a:fillRect/>
+          </a:stretch>
+        </p:blipFill>
         <p:spPr>
           <a:xfrm>
-            <a:off x="324464" y="452283"/>
-            <a:ext cx="10117393" cy="5078313"/>
+            <a:off x="1742219" y="3429000"/>
+            <a:ext cx="7772400" cy="606682"/>
           </a:xfrm>
           <a:prstGeom prst="rect">
             <a:avLst/>
           </a:prstGeom>
-          <a:noFill/>
         </p:spPr>
-        <p:txBody>
-          <a:bodyPr wrap="square" rtlCol="0">
-            <a:spAutoFit/>
-          </a:bodyPr>
-          <a:lstStyle/>
-          <a:p>
-            <a:r>
-              <a:rPr lang="en-NL" dirty="0"/>
-              <a:t>Bulk copy with Lookup and ForEach</a:t>
-            </a:r>
-          </a:p>
-          <a:p>
-            <a:endParaRPr lang="en-NL" dirty="0"/>
-          </a:p>
-          <a:p>
-            <a:pPr marL="285750" indent="-285750">
-              <a:buFontTx/>
-              <a:buChar char="-"/>
-            </a:pPr>
-            <a:r>
-              <a:rPr lang="en-NL" dirty="0"/>
-              <a:t>Lookup: </a:t>
-            </a:r>
-          </a:p>
-          <a:p>
-            <a:pPr marL="742950" lvl="1" indent="-285750">
-              <a:buFontTx/>
-              <a:buChar char="-"/>
-            </a:pPr>
-            <a:r>
-              <a:rPr lang="en-NL" dirty="0"/>
-              <a:t>Retrieve dataset action (content of file or table) </a:t>
-            </a:r>
-          </a:p>
-          <a:p>
-            <a:pPr marL="742950" lvl="1" indent="-285750">
-              <a:buFontTx/>
-              <a:buChar char="-"/>
-            </a:pPr>
-            <a:r>
-              <a:rPr lang="en-NL" dirty="0"/>
-              <a:t>Used to dynamically determine list of objects</a:t>
-            </a:r>
-          </a:p>
-          <a:p>
-            <a:pPr marL="742950" lvl="1" indent="-285750">
-              <a:buFontTx/>
-              <a:buChar char="-"/>
-            </a:pPr>
-            <a:r>
-              <a:rPr lang="en-NL" dirty="0"/>
-              <a:t>Supports most data factory data sources</a:t>
-            </a:r>
-          </a:p>
-          <a:p>
-            <a:pPr marL="742950" lvl="1" indent="-285750">
-              <a:buFontTx/>
-              <a:buChar char="-"/>
-            </a:pPr>
-            <a:r>
-              <a:rPr lang="en-GB" dirty="0"/>
-              <a:t>T</a:t>
-            </a:r>
-            <a:r>
-              <a:rPr lang="en-NL" dirty="0"/>
-              <a:t>he Loopup returns list or first row of data</a:t>
-            </a:r>
-          </a:p>
-          <a:p>
-            <a:pPr marL="742950" lvl="1" indent="-285750">
-              <a:buFontTx/>
-              <a:buChar char="-"/>
-            </a:pPr>
-            <a:r>
-              <a:rPr lang="en-NL" dirty="0"/>
-              <a:t>Maximum of 2MB of data</a:t>
-            </a:r>
-          </a:p>
-          <a:p>
-            <a:pPr marL="742950" lvl="1" indent="-285750">
-              <a:buFontTx/>
-              <a:buChar char="-"/>
-            </a:pPr>
-            <a:r>
-              <a:rPr lang="en-NL" dirty="0"/>
-              <a:t>Maximum of 5000 rows of data</a:t>
-            </a:r>
-          </a:p>
-          <a:p>
-            <a:pPr marL="285750" indent="-285750">
-              <a:buFontTx/>
-              <a:buChar char="-"/>
-            </a:pPr>
-            <a:r>
-              <a:rPr lang="en-NL" dirty="0"/>
-              <a:t>ForEach: </a:t>
-            </a:r>
-          </a:p>
-          <a:p>
-            <a:pPr marL="742950" lvl="1" indent="-285750">
-              <a:buFontTx/>
-              <a:buChar char="-"/>
-            </a:pPr>
-            <a:r>
-              <a:rPr lang="en-GB" dirty="0"/>
-              <a:t>E</a:t>
-            </a:r>
-            <a:r>
-              <a:rPr lang="en-NL" dirty="0"/>
-              <a:t>xecute set of activities for each object in the list</a:t>
-            </a:r>
-          </a:p>
-          <a:p>
-            <a:pPr marL="742950" lvl="1" indent="-285750">
-              <a:buFontTx/>
-              <a:buChar char="-"/>
-            </a:pPr>
-            <a:r>
-              <a:rPr lang="en-NL" dirty="0"/>
-              <a:t>ForEach iterates over list of objects from previous steps</a:t>
-            </a:r>
-          </a:p>
-          <a:p>
-            <a:pPr marL="742950" lvl="1" indent="-285750">
-              <a:buFontTx/>
-              <a:buChar char="-"/>
-            </a:pPr>
-            <a:r>
-              <a:rPr lang="en-GB" dirty="0"/>
-              <a:t>C</a:t>
-            </a:r>
-            <a:r>
-              <a:rPr lang="en-NL" dirty="0"/>
-              <a:t>an’t nest Foreach, use pipelines instead</a:t>
-            </a:r>
-          </a:p>
-          <a:p>
-            <a:pPr marL="742950" lvl="1" indent="-285750">
-              <a:buFontTx/>
-              <a:buChar char="-"/>
-            </a:pPr>
-            <a:endParaRPr lang="en-NL" dirty="0"/>
-          </a:p>
-          <a:p>
-            <a:pPr marL="285750" indent="-285750">
-              <a:buFontTx/>
-              <a:buChar char="-"/>
-            </a:pPr>
-            <a:r>
-              <a:rPr lang="en-GB" dirty="0"/>
-              <a:t>T</a:t>
-            </a:r>
-            <a:r>
-              <a:rPr lang="en-NL" dirty="0"/>
-              <a:t>o merge csv files, json files, and avro files to one another, we can use copy activity because they have same columns in ADF</a:t>
-            </a:r>
-          </a:p>
-          <a:p>
-            <a:pPr marL="285750" indent="-285750">
-              <a:buFontTx/>
-              <a:buChar char="-"/>
-            </a:pPr>
-            <a:r>
-              <a:rPr lang="en-NL" dirty="0"/>
-              <a:t>But I will need to use data flows to merge tables together that have different column names</a:t>
-            </a:r>
-          </a:p>
-          <a:p>
-            <a:pPr marL="285750" indent="-285750">
-              <a:buFontTx/>
-              <a:buChar char="-"/>
-            </a:pPr>
-            <a:r>
-              <a:rPr lang="en-NL" dirty="0"/>
-              <a:t>With the Wildcard file path I can select all the files in a particular container</a:t>
-            </a:r>
-          </a:p>
-        </p:txBody>
-      </p:sp>
+      </p:pic>
     </p:spTree>
     <p:extLst>
       <p:ext uri="{BB962C8B-B14F-4D97-AF65-F5344CB8AC3E}">
-        <p14:creationId xmlns:p14="http://schemas.microsoft.com/office/powerpoint/2010/main" val="3313498520"/>
+        <p14:creationId xmlns:p14="http://schemas.microsoft.com/office/powerpoint/2010/main" val="1678326039"/>
       </p:ext>
     </p:extLst>
   </p:cSld>
@@ -5124,10 +5871,264 @@
       </p:grpSpPr>
       <p:sp>
         <p:nvSpPr>
-          <p:cNvPr id="10" name="Rectangle 9">
-            <a:extLst>
-              <a:ext uri="{FF2B5EF4-FFF2-40B4-BE49-F238E27FC236}">
-                <a16:creationId xmlns:a16="http://schemas.microsoft.com/office/drawing/2014/main" id="{40977CF2-5F16-8903-8A81-292C32D449B6}"/>
+          <p:cNvPr id="2" name="Title 1">
+            <a:extLst>
+              <a:ext uri="{FF2B5EF4-FFF2-40B4-BE49-F238E27FC236}">
+                <a16:creationId xmlns:a16="http://schemas.microsoft.com/office/drawing/2014/main" id="{183D4777-7777-4E14-B951-0EF6C348AA91}"/>
+              </a:ext>
+            </a:extLst>
+          </p:cNvPr>
+          <p:cNvSpPr>
+            <a:spLocks noGrp="1"/>
+          </p:cNvSpPr>
+          <p:nvPr>
+            <p:ph type="title"/>
+          </p:nvPr>
+        </p:nvSpPr>
+        <p:spPr>
+          <a:xfrm>
+            <a:off x="838200" y="2766218"/>
+            <a:ext cx="10515600" cy="1325563"/>
+          </a:xfrm>
+        </p:spPr>
+        <p:txBody>
+          <a:bodyPr/>
+          <a:lstStyle/>
+          <a:p>
+            <a:r>
+              <a:rPr lang="en-NL" b="1" dirty="0"/>
+              <a:t>The Pipelines</a:t>
+            </a:r>
+          </a:p>
+        </p:txBody>
+      </p:sp>
+    </p:spTree>
+    <p:extLst>
+      <p:ext uri="{BB962C8B-B14F-4D97-AF65-F5344CB8AC3E}">
+        <p14:creationId xmlns:p14="http://schemas.microsoft.com/office/powerpoint/2010/main" val="1258934312"/>
+      </p:ext>
+    </p:extLst>
+  </p:cSld>
+  <p:clrMapOvr>
+    <a:masterClrMapping/>
+  </p:clrMapOvr>
+</p:sld>
+</file>
+
+<file path=ppt/slides/slide15.xml><?xml version="1.0" encoding="utf-8"?>
+<p:sld xmlns:a="http://schemas.openxmlformats.org/drawingml/2006/main" xmlns:r="http://schemas.openxmlformats.org/officeDocument/2006/relationships" xmlns:p="http://schemas.openxmlformats.org/presentationml/2006/main">
+  <p:cSld>
+    <p:spTree>
+      <p:nvGrpSpPr>
+        <p:cNvPr id="1" name=""/>
+        <p:cNvGrpSpPr/>
+        <p:nvPr/>
+      </p:nvGrpSpPr>
+      <p:grpSpPr>
+        <a:xfrm>
+          <a:off x="0" y="0"/>
+          <a:ext cx="0" cy="0"/>
+          <a:chOff x="0" y="0"/>
+          <a:chExt cx="0" cy="0"/>
+        </a:xfrm>
+      </p:grpSpPr>
+      <p:pic>
+        <p:nvPicPr>
+          <p:cNvPr id="6" name="Picture 5" descr="A diagram of data processing&#10;&#10;Description automatically generated">
+            <a:extLst>
+              <a:ext uri="{FF2B5EF4-FFF2-40B4-BE49-F238E27FC236}">
+                <a16:creationId xmlns:a16="http://schemas.microsoft.com/office/drawing/2014/main" id="{128E97A3-2D54-CA0D-5B42-26DC3FEE66BC}"/>
+              </a:ext>
+            </a:extLst>
+          </p:cNvPr>
+          <p:cNvPicPr>
+            <a:picLocks noChangeAspect="1"/>
+          </p:cNvPicPr>
+          <p:nvPr/>
+        </p:nvPicPr>
+        <p:blipFill>
+          <a:blip r:embed="rId3"/>
+          <a:stretch>
+            <a:fillRect/>
+          </a:stretch>
+        </p:blipFill>
+        <p:spPr>
+          <a:xfrm>
+            <a:off x="235979" y="622128"/>
+            <a:ext cx="6159500" cy="1511300"/>
+          </a:xfrm>
+          <a:prstGeom prst="rect">
+            <a:avLst/>
+          </a:prstGeom>
+        </p:spPr>
+      </p:pic>
+      <p:pic>
+        <p:nvPicPr>
+          <p:cNvPr id="9" name="Picture 8">
+            <a:extLst>
+              <a:ext uri="{FF2B5EF4-FFF2-40B4-BE49-F238E27FC236}">
+                <a16:creationId xmlns:a16="http://schemas.microsoft.com/office/drawing/2014/main" id="{C30013D7-5411-0B86-A135-B10638A5552D}"/>
+              </a:ext>
+            </a:extLst>
+          </p:cNvPr>
+          <p:cNvPicPr>
+            <a:picLocks noChangeAspect="1"/>
+          </p:cNvPicPr>
+          <p:nvPr/>
+        </p:nvPicPr>
+        <p:blipFill>
+          <a:blip r:embed="rId4"/>
+          <a:stretch>
+            <a:fillRect/>
+          </a:stretch>
+        </p:blipFill>
+        <p:spPr>
+          <a:xfrm>
+            <a:off x="891822" y="3429000"/>
+            <a:ext cx="10408356" cy="1101160"/>
+          </a:xfrm>
+          <a:prstGeom prst="rect">
+            <a:avLst/>
+          </a:prstGeom>
+        </p:spPr>
+      </p:pic>
+      <p:cxnSp>
+        <p:nvCxnSpPr>
+          <p:cNvPr id="13" name="Straight Arrow Connector 12">
+            <a:extLst>
+              <a:ext uri="{FF2B5EF4-FFF2-40B4-BE49-F238E27FC236}">
+                <a16:creationId xmlns:a16="http://schemas.microsoft.com/office/drawing/2014/main" id="{B25175F4-2758-AD32-45FC-0BAA9B3AA379}"/>
+              </a:ext>
+            </a:extLst>
+          </p:cNvPr>
+          <p:cNvCxnSpPr>
+            <a:cxnSpLocks/>
+          </p:cNvCxnSpPr>
+          <p:nvPr/>
+        </p:nvCxnSpPr>
+        <p:spPr>
+          <a:xfrm>
+            <a:off x="4819135" y="1964724"/>
+            <a:ext cx="0" cy="1252201"/>
+          </a:xfrm>
+          <a:prstGeom prst="straightConnector1">
+            <a:avLst/>
+          </a:prstGeom>
+          <a:ln>
+            <a:tailEnd type="triangle"/>
+          </a:ln>
+        </p:spPr>
+        <p:style>
+          <a:lnRef idx="1">
+            <a:schemeClr val="accent6"/>
+          </a:lnRef>
+          <a:fillRef idx="0">
+            <a:schemeClr val="accent6"/>
+          </a:fillRef>
+          <a:effectRef idx="0">
+            <a:schemeClr val="accent6"/>
+          </a:effectRef>
+          <a:fontRef idx="minor">
+            <a:schemeClr val="tx1"/>
+          </a:fontRef>
+        </p:style>
+      </p:cxnSp>
+    </p:spTree>
+    <p:extLst>
+      <p:ext uri="{BB962C8B-B14F-4D97-AF65-F5344CB8AC3E}">
+        <p14:creationId xmlns:p14="http://schemas.microsoft.com/office/powerpoint/2010/main" val="4162815486"/>
+      </p:ext>
+    </p:extLst>
+  </p:cSld>
+  <p:clrMapOvr>
+    <a:masterClrMapping/>
+  </p:clrMapOvr>
+</p:sld>
+</file>
+
+<file path=ppt/slides/slide16.xml><?xml version="1.0" encoding="utf-8"?>
+<p:sld xmlns:a="http://schemas.openxmlformats.org/drawingml/2006/main" xmlns:r="http://schemas.openxmlformats.org/officeDocument/2006/relationships" xmlns:p="http://schemas.openxmlformats.org/presentationml/2006/main">
+  <p:cSld>
+    <p:spTree>
+      <p:nvGrpSpPr>
+        <p:cNvPr id="1" name=""/>
+        <p:cNvGrpSpPr/>
+        <p:nvPr/>
+      </p:nvGrpSpPr>
+      <p:grpSpPr>
+        <a:xfrm>
+          <a:off x="0" y="0"/>
+          <a:ext cx="0" cy="0"/>
+          <a:chOff x="0" y="0"/>
+          <a:chExt cx="0" cy="0"/>
+        </a:xfrm>
+      </p:grpSpPr>
+      <p:pic>
+        <p:nvPicPr>
+          <p:cNvPr id="3" name="Picture 2" descr="A screenshot of a computer&#10;&#10;Description automatically generated">
+            <a:extLst>
+              <a:ext uri="{FF2B5EF4-FFF2-40B4-BE49-F238E27FC236}">
+                <a16:creationId xmlns:a16="http://schemas.microsoft.com/office/drawing/2014/main" id="{4F69C05F-24F4-E19D-1123-EEE022E00752}"/>
+              </a:ext>
+            </a:extLst>
+          </p:cNvPr>
+          <p:cNvPicPr>
+            <a:picLocks noChangeAspect="1"/>
+          </p:cNvPicPr>
+          <p:nvPr/>
+        </p:nvPicPr>
+        <p:blipFill>
+          <a:blip r:embed="rId3"/>
+          <a:stretch>
+            <a:fillRect/>
+          </a:stretch>
+        </p:blipFill>
+        <p:spPr>
+          <a:xfrm>
+            <a:off x="4323450" y="148948"/>
+            <a:ext cx="2717800" cy="1625600"/>
+          </a:xfrm>
+          <a:prstGeom prst="rect">
+            <a:avLst/>
+          </a:prstGeom>
+        </p:spPr>
+      </p:pic>
+      <p:pic>
+        <p:nvPicPr>
+          <p:cNvPr id="5" name="Picture 4" descr="A screenshot of a computer&#10;&#10;Description automatically generated">
+            <a:extLst>
+              <a:ext uri="{FF2B5EF4-FFF2-40B4-BE49-F238E27FC236}">
+                <a16:creationId xmlns:a16="http://schemas.microsoft.com/office/drawing/2014/main" id="{9D271B1E-337F-BCB3-5943-8C0D60A10466}"/>
+              </a:ext>
+            </a:extLst>
+          </p:cNvPr>
+          <p:cNvPicPr>
+            <a:picLocks noChangeAspect="1"/>
+          </p:cNvPicPr>
+          <p:nvPr/>
+        </p:nvPicPr>
+        <p:blipFill>
+          <a:blip r:embed="rId4"/>
+          <a:stretch>
+            <a:fillRect/>
+          </a:stretch>
+        </p:blipFill>
+        <p:spPr>
+          <a:xfrm>
+            <a:off x="385818" y="2228192"/>
+            <a:ext cx="5132836" cy="2212429"/>
+          </a:xfrm>
+          <a:prstGeom prst="rect">
+            <a:avLst/>
+          </a:prstGeom>
+        </p:spPr>
+      </p:pic>
+      <p:sp>
+        <p:nvSpPr>
+          <p:cNvPr id="7" name="Oval 6">
+            <a:extLst>
+              <a:ext uri="{FF2B5EF4-FFF2-40B4-BE49-F238E27FC236}">
+                <a16:creationId xmlns:a16="http://schemas.microsoft.com/office/drawing/2014/main" id="{2112DFB2-7E09-F1D5-437A-2BF63BF2B1E4}"/>
               </a:ext>
             </a:extLst>
           </p:cNvPr>
@@ -5136,10 +6137,10 @@
         </p:nvSpPr>
         <p:spPr>
           <a:xfrm>
-            <a:off x="1577230" y="1793808"/>
-            <a:ext cx="1627365" cy="1370412"/>
+            <a:off x="5303978" y="2039007"/>
+            <a:ext cx="378372" cy="378372"/>
           </a:xfrm>
-          <a:prstGeom prst="rect">
+          <a:prstGeom prst="ellipse">
             <a:avLst/>
           </a:prstGeom>
         </p:spPr>
@@ -5165,25 +6166,18 @@
           <a:p>
             <a:pPr algn="ctr"/>
             <a:r>
-              <a:rPr lang="en-NL" sz="1400" u="sng" dirty="0"/>
-              <a:t>Copy data</a:t>
-            </a:r>
-          </a:p>
-          <a:p>
-            <a:pPr algn="ctr"/>
-            <a:r>
-              <a:rPr lang="en-NL" sz="1400" dirty="0"/>
-              <a:t>Extract and Merge Tables</a:t>
+              <a:rPr lang="en-NL" dirty="0"/>
+              <a:t>1</a:t>
             </a:r>
           </a:p>
         </p:txBody>
       </p:sp>
       <p:pic>
         <p:nvPicPr>
-          <p:cNvPr id="12" name="Picture 11">
-            <a:extLst>
-              <a:ext uri="{FF2B5EF4-FFF2-40B4-BE49-F238E27FC236}">
-                <a16:creationId xmlns:a16="http://schemas.microsoft.com/office/drawing/2014/main" id="{52A8AEEA-F2EC-E0A2-7BC2-3360DCBF6BEE}"/>
+          <p:cNvPr id="10" name="Picture 9" descr="A screenshot of a computer&#10;&#10;Description automatically generated">
+            <a:extLst>
+              <a:ext uri="{FF2B5EF4-FFF2-40B4-BE49-F238E27FC236}">
+                <a16:creationId xmlns:a16="http://schemas.microsoft.com/office/drawing/2014/main" id="{DB425D1D-D873-594B-7112-25DD56CF8528}"/>
               </a:ext>
             </a:extLst>
           </p:cNvPr>
@@ -5193,15 +6187,15 @@
           <p:nvPr/>
         </p:nvPicPr>
         <p:blipFill>
-          <a:blip r:embed="rId3"/>
+          <a:blip r:embed="rId5"/>
           <a:stretch>
             <a:fillRect/>
           </a:stretch>
         </p:blipFill>
         <p:spPr>
           <a:xfrm>
-            <a:off x="1995607" y="4709758"/>
-            <a:ext cx="7772400" cy="606682"/>
+            <a:off x="5702835" y="2228192"/>
+            <a:ext cx="6236683" cy="2343807"/>
           </a:xfrm>
           <a:prstGeom prst="rect">
             <a:avLst/>
@@ -5210,10 +6204,10 @@
       </p:pic>
       <p:sp>
         <p:nvSpPr>
-          <p:cNvPr id="2" name="Rectangle 1">
-            <a:extLst>
-              <a:ext uri="{FF2B5EF4-FFF2-40B4-BE49-F238E27FC236}">
-                <a16:creationId xmlns:a16="http://schemas.microsoft.com/office/drawing/2014/main" id="{63B7D8D3-DC26-2437-5829-52EDD64549C7}"/>
+          <p:cNvPr id="11" name="Oval 10">
+            <a:extLst>
+              <a:ext uri="{FF2B5EF4-FFF2-40B4-BE49-F238E27FC236}">
+                <a16:creationId xmlns:a16="http://schemas.microsoft.com/office/drawing/2014/main" id="{7EE2CB9B-FC4D-BC29-FA18-444CD9AA426F}"/>
               </a:ext>
             </a:extLst>
           </p:cNvPr>
@@ -5222,10 +6216,10 @@
         </p:nvSpPr>
         <p:spPr>
           <a:xfrm>
-            <a:off x="4878581" y="1793808"/>
-            <a:ext cx="1627365" cy="1370412"/>
+            <a:off x="11750332" y="2039006"/>
+            <a:ext cx="378372" cy="378372"/>
           </a:xfrm>
-          <a:prstGeom prst="rect">
+          <a:prstGeom prst="ellipse">
             <a:avLst/>
           </a:prstGeom>
         </p:spPr>
@@ -5251,96 +6245,182 @@
           <a:p>
             <a:pPr algn="ctr"/>
             <a:r>
-              <a:rPr lang="en-NL" sz="1400" u="sng" dirty="0"/>
-              <a:t>Data flow</a:t>
-            </a:r>
-          </a:p>
-          <a:p>
-            <a:pPr algn="ctr"/>
-            <a:r>
-              <a:rPr lang="en-NL" sz="1400" dirty="0"/>
-              <a:t>Data cleaning by removing duplicates</a:t>
-            </a:r>
-          </a:p>
-        </p:txBody>
-      </p:sp>
-      <p:sp>
-        <p:nvSpPr>
-          <p:cNvPr id="3" name="Rectangle 2">
-            <a:extLst>
-              <a:ext uri="{FF2B5EF4-FFF2-40B4-BE49-F238E27FC236}">
-                <a16:creationId xmlns:a16="http://schemas.microsoft.com/office/drawing/2014/main" id="{C3C938A9-E47E-4DE8-0E29-4B576F051101}"/>
-              </a:ext>
-            </a:extLst>
-          </p:cNvPr>
-          <p:cNvSpPr/>
+              <a:rPr lang="en-NL" dirty="0"/>
+              <a:t>2</a:t>
+            </a:r>
+          </a:p>
+        </p:txBody>
+      </p:sp>
+    </p:spTree>
+    <p:extLst>
+      <p:ext uri="{BB962C8B-B14F-4D97-AF65-F5344CB8AC3E}">
+        <p14:creationId xmlns:p14="http://schemas.microsoft.com/office/powerpoint/2010/main" val="487265049"/>
+      </p:ext>
+    </p:extLst>
+  </p:cSld>
+  <p:clrMapOvr>
+    <a:masterClrMapping/>
+  </p:clrMapOvr>
+</p:sld>
+</file>
+
+<file path=ppt/slides/slide17.xml><?xml version="1.0" encoding="utf-8"?>
+<p:sld xmlns:a="http://schemas.openxmlformats.org/drawingml/2006/main" xmlns:r="http://schemas.openxmlformats.org/officeDocument/2006/relationships" xmlns:p="http://schemas.openxmlformats.org/presentationml/2006/main">
+  <p:cSld>
+    <p:spTree>
+      <p:nvGrpSpPr>
+        <p:cNvPr id="1" name=""/>
+        <p:cNvGrpSpPr/>
+        <p:nvPr/>
+      </p:nvGrpSpPr>
+      <p:grpSpPr>
+        <a:xfrm>
+          <a:off x="0" y="0"/>
+          <a:ext cx="0" cy="0"/>
+          <a:chOff x="0" y="0"/>
+          <a:chExt cx="0" cy="0"/>
+        </a:xfrm>
+      </p:grpSpPr>
+      <p:pic>
+        <p:nvPicPr>
+          <p:cNvPr id="12" name="Picture 11" descr="A screenshot of a computer&#10;&#10;Description automatically generated">
+            <a:extLst>
+              <a:ext uri="{FF2B5EF4-FFF2-40B4-BE49-F238E27FC236}">
+                <a16:creationId xmlns:a16="http://schemas.microsoft.com/office/drawing/2014/main" id="{32BC976B-27A7-3716-5BC6-355941B58771}"/>
+              </a:ext>
+            </a:extLst>
+          </p:cNvPr>
+          <p:cNvPicPr>
+            <a:picLocks noChangeAspect="1"/>
+          </p:cNvPicPr>
           <p:nvPr/>
-        </p:nvSpPr>
+        </p:nvPicPr>
+        <p:blipFill>
+          <a:blip r:embed="rId3"/>
+          <a:stretch>
+            <a:fillRect/>
+          </a:stretch>
+        </p:blipFill>
         <p:spPr>
           <a:xfrm>
-            <a:off x="8313641" y="1793808"/>
-            <a:ext cx="1627365" cy="1370412"/>
+            <a:off x="4727384" y="1843516"/>
+            <a:ext cx="2561410" cy="1298249"/>
           </a:xfrm>
           <a:prstGeom prst="rect">
             <a:avLst/>
           </a:prstGeom>
         </p:spPr>
-        <p:style>
-          <a:lnRef idx="2">
-            <a:schemeClr val="accent1">
-              <a:shade val="15000"/>
-            </a:schemeClr>
-          </a:lnRef>
-          <a:fillRef idx="1">
-            <a:schemeClr val="accent1"/>
-          </a:fillRef>
-          <a:effectRef idx="0">
-            <a:schemeClr val="accent1"/>
-          </a:effectRef>
-          <a:fontRef idx="minor">
-            <a:schemeClr val="lt1"/>
-          </a:fontRef>
-        </p:style>
-        <p:txBody>
-          <a:bodyPr rtlCol="0" anchor="ctr"/>
-          <a:lstStyle/>
-          <a:p>
-            <a:pPr algn="ctr"/>
-            <a:r>
-              <a:rPr lang="en-NL" sz="1400" u="sng" dirty="0"/>
-              <a:t>Copy data</a:t>
-            </a:r>
-          </a:p>
-          <a:p>
-            <a:pPr algn="ctr"/>
-            <a:r>
-              <a:rPr lang="en-NL" sz="1400" dirty="0"/>
-              <a:t>Load the transformed data into a table in SQL Database</a:t>
-            </a:r>
-          </a:p>
-        </p:txBody>
-      </p:sp>
+      </p:pic>
+      <p:pic>
+        <p:nvPicPr>
+          <p:cNvPr id="14" name="Picture 13" descr="A screenshot of a computer&#10;&#10;Description automatically generated">
+            <a:extLst>
+              <a:ext uri="{FF2B5EF4-FFF2-40B4-BE49-F238E27FC236}">
+                <a16:creationId xmlns:a16="http://schemas.microsoft.com/office/drawing/2014/main" id="{07E9AD55-F2BA-165D-4E65-B0DA2A256E37}"/>
+              </a:ext>
+            </a:extLst>
+          </p:cNvPr>
+          <p:cNvPicPr>
+            <a:picLocks noChangeAspect="1"/>
+          </p:cNvPicPr>
+          <p:nvPr/>
+        </p:nvPicPr>
+        <p:blipFill rotWithShape="1">
+          <a:blip r:embed="rId4"/>
+          <a:srcRect r="31161"/>
+          <a:stretch/>
+        </p:blipFill>
+        <p:spPr>
+          <a:xfrm>
+            <a:off x="531341" y="3429000"/>
+            <a:ext cx="5350475" cy="2973609"/>
+          </a:xfrm>
+          <a:prstGeom prst="rect">
+            <a:avLst/>
+          </a:prstGeom>
+        </p:spPr>
+      </p:pic>
+      <p:pic>
+        <p:nvPicPr>
+          <p:cNvPr id="16" name="Picture 15" descr="A screenshot of a computer&#10;&#10;Description automatically generated">
+            <a:extLst>
+              <a:ext uri="{FF2B5EF4-FFF2-40B4-BE49-F238E27FC236}">
+                <a16:creationId xmlns:a16="http://schemas.microsoft.com/office/drawing/2014/main" id="{CF695D2D-4C90-864F-220F-78223891BE71}"/>
+              </a:ext>
+            </a:extLst>
+          </p:cNvPr>
+          <p:cNvPicPr>
+            <a:picLocks noChangeAspect="1"/>
+          </p:cNvPicPr>
+          <p:nvPr/>
+        </p:nvPicPr>
+        <p:blipFill>
+          <a:blip r:embed="rId5"/>
+          <a:stretch>
+            <a:fillRect/>
+          </a:stretch>
+        </p:blipFill>
+        <p:spPr>
+          <a:xfrm>
+            <a:off x="6310186" y="4266679"/>
+            <a:ext cx="5714303" cy="1298249"/>
+          </a:xfrm>
+          <a:prstGeom prst="rect">
+            <a:avLst/>
+          </a:prstGeom>
+        </p:spPr>
+      </p:pic>
+      <p:pic>
+        <p:nvPicPr>
+          <p:cNvPr id="18" name="Picture 17" descr="A screenshot of a computer&#10;&#10;Description automatically generated">
+            <a:extLst>
+              <a:ext uri="{FF2B5EF4-FFF2-40B4-BE49-F238E27FC236}">
+                <a16:creationId xmlns:a16="http://schemas.microsoft.com/office/drawing/2014/main" id="{CDCF9F0F-ECB0-286A-0678-5287551DDE5C}"/>
+              </a:ext>
+            </a:extLst>
+          </p:cNvPr>
+          <p:cNvPicPr>
+            <a:picLocks noChangeAspect="1"/>
+          </p:cNvPicPr>
+          <p:nvPr/>
+        </p:nvPicPr>
+        <p:blipFill>
+          <a:blip r:embed="rId6"/>
+          <a:stretch>
+            <a:fillRect/>
+          </a:stretch>
+        </p:blipFill>
+        <p:spPr>
+          <a:xfrm>
+            <a:off x="4846000" y="239933"/>
+            <a:ext cx="2324177" cy="1316348"/>
+          </a:xfrm>
+          <a:prstGeom prst="rect">
+            <a:avLst/>
+          </a:prstGeom>
+        </p:spPr>
+      </p:pic>
       <p:cxnSp>
         <p:nvCxnSpPr>
-          <p:cNvPr id="5" name="Straight Arrow Connector 4">
-            <a:extLst>
-              <a:ext uri="{FF2B5EF4-FFF2-40B4-BE49-F238E27FC236}">
-                <a16:creationId xmlns:a16="http://schemas.microsoft.com/office/drawing/2014/main" id="{0F353E57-61D0-8931-599C-9FCE39E700E1}"/>
+          <p:cNvPr id="20" name="Elbow Connector 19">
+            <a:extLst>
+              <a:ext uri="{FF2B5EF4-FFF2-40B4-BE49-F238E27FC236}">
+                <a16:creationId xmlns:a16="http://schemas.microsoft.com/office/drawing/2014/main" id="{BBA73F1D-E177-8C33-D582-7C95BCD421BE}"/>
               </a:ext>
             </a:extLst>
           </p:cNvPr>
           <p:cNvCxnSpPr>
-            <a:stCxn id="10" idx="3"/>
-            <a:endCxn id="2" idx="1"/>
+            <a:stCxn id="12" idx="1"/>
+            <a:endCxn id="14" idx="0"/>
           </p:cNvCxnSpPr>
           <p:nvPr/>
         </p:nvCxnSpPr>
         <p:spPr>
-          <a:xfrm>
-            <a:off x="3204595" y="2479014"/>
-            <a:ext cx="1673986" cy="0"/>
+          <a:xfrm rot="10800000" flipV="1">
+            <a:off x="3206580" y="2492640"/>
+            <a:ext cx="1520805" cy="936359"/>
           </a:xfrm>
-          <a:prstGeom prst="straightConnector1">
+          <a:prstGeom prst="bentConnector2">
             <a:avLst/>
           </a:prstGeom>
           <a:ln>
@@ -5367,23 +6447,68 @@
       </p:cxnSp>
       <p:cxnSp>
         <p:nvCxnSpPr>
-          <p:cNvPr id="8" name="Straight Arrow Connector 7">
-            <a:extLst>
-              <a:ext uri="{FF2B5EF4-FFF2-40B4-BE49-F238E27FC236}">
-                <a16:creationId xmlns:a16="http://schemas.microsoft.com/office/drawing/2014/main" id="{02AA77F1-1285-20D4-8536-9958E6448F03}"/>
+          <p:cNvPr id="22" name="Elbow Connector 21">
+            <a:extLst>
+              <a:ext uri="{FF2B5EF4-FFF2-40B4-BE49-F238E27FC236}">
+                <a16:creationId xmlns:a16="http://schemas.microsoft.com/office/drawing/2014/main" id="{12B2B2A6-47DE-7919-BA3F-83FB9EDD47FB}"/>
               </a:ext>
             </a:extLst>
           </p:cNvPr>
           <p:cNvCxnSpPr>
-            <a:stCxn id="2" idx="3"/>
-            <a:endCxn id="3" idx="1"/>
+            <a:stCxn id="12" idx="3"/>
+            <a:endCxn id="16" idx="0"/>
           </p:cNvCxnSpPr>
           <p:nvPr/>
         </p:nvCxnSpPr>
         <p:spPr>
           <a:xfrm>
-            <a:off x="6505946" y="2479014"/>
-            <a:ext cx="1807695" cy="0"/>
+            <a:off x="7288794" y="2492641"/>
+            <a:ext cx="1878544" cy="1774038"/>
+          </a:xfrm>
+          <a:prstGeom prst="bentConnector2">
+            <a:avLst/>
+          </a:prstGeom>
+          <a:ln>
+            <a:solidFill>
+              <a:srgbClr val="FFC000"/>
+            </a:solidFill>
+            <a:tailEnd type="triangle"/>
+          </a:ln>
+        </p:spPr>
+        <p:style>
+          <a:lnRef idx="2">
+            <a:schemeClr val="accent1"/>
+          </a:lnRef>
+          <a:fillRef idx="0">
+            <a:schemeClr val="accent1"/>
+          </a:fillRef>
+          <a:effectRef idx="1">
+            <a:schemeClr val="accent1"/>
+          </a:effectRef>
+          <a:fontRef idx="minor">
+            <a:schemeClr val="tx1"/>
+          </a:fontRef>
+        </p:style>
+      </p:cxnSp>
+      <p:cxnSp>
+        <p:nvCxnSpPr>
+          <p:cNvPr id="24" name="Straight Arrow Connector 23">
+            <a:extLst>
+              <a:ext uri="{FF2B5EF4-FFF2-40B4-BE49-F238E27FC236}">
+                <a16:creationId xmlns:a16="http://schemas.microsoft.com/office/drawing/2014/main" id="{E0CE7A5D-9374-BD5A-B581-95CCC784533E}"/>
+              </a:ext>
+            </a:extLst>
+          </p:cNvPr>
+          <p:cNvCxnSpPr>
+            <a:stCxn id="18" idx="2"/>
+            <a:endCxn id="12" idx="0"/>
+          </p:cNvCxnSpPr>
+          <p:nvPr/>
+        </p:nvCxnSpPr>
+        <p:spPr>
+          <a:xfrm>
+            <a:off x="6008089" y="1556281"/>
+            <a:ext cx="0" cy="287235"/>
           </a:xfrm>
           <a:prstGeom prst="straightConnector1">
             <a:avLst/>
@@ -5413,7 +6538,589 @@
     </p:spTree>
     <p:extLst>
       <p:ext uri="{BB962C8B-B14F-4D97-AF65-F5344CB8AC3E}">
-        <p14:creationId xmlns:p14="http://schemas.microsoft.com/office/powerpoint/2010/main" val="1678326039"/>
+        <p14:creationId xmlns:p14="http://schemas.microsoft.com/office/powerpoint/2010/main" val="2016760441"/>
+      </p:ext>
+    </p:extLst>
+  </p:cSld>
+  <p:clrMapOvr>
+    <a:masterClrMapping/>
+  </p:clrMapOvr>
+</p:sld>
+</file>
+
+<file path=ppt/slides/slide18.xml><?xml version="1.0" encoding="utf-8"?>
+<p:sld xmlns:a="http://schemas.openxmlformats.org/drawingml/2006/main" xmlns:r="http://schemas.openxmlformats.org/officeDocument/2006/relationships" xmlns:p="http://schemas.openxmlformats.org/presentationml/2006/main">
+  <p:cSld>
+    <p:spTree>
+      <p:nvGrpSpPr>
+        <p:cNvPr id="1" name=""/>
+        <p:cNvGrpSpPr/>
+        <p:nvPr/>
+      </p:nvGrpSpPr>
+      <p:grpSpPr>
+        <a:xfrm>
+          <a:off x="0" y="0"/>
+          <a:ext cx="0" cy="0"/>
+          <a:chOff x="0" y="0"/>
+          <a:chExt cx="0" cy="0"/>
+        </a:xfrm>
+      </p:grpSpPr>
+      <p:pic>
+        <p:nvPicPr>
+          <p:cNvPr id="18" name="Picture 17" descr="A screenshot of a computer&#10;&#10;Description automatically generated">
+            <a:extLst>
+              <a:ext uri="{FF2B5EF4-FFF2-40B4-BE49-F238E27FC236}">
+                <a16:creationId xmlns:a16="http://schemas.microsoft.com/office/drawing/2014/main" id="{CDCF9F0F-ECB0-286A-0678-5287551DDE5C}"/>
+              </a:ext>
+            </a:extLst>
+          </p:cNvPr>
+          <p:cNvPicPr>
+            <a:picLocks noChangeAspect="1"/>
+          </p:cNvPicPr>
+          <p:nvPr/>
+        </p:nvPicPr>
+        <p:blipFill>
+          <a:blip r:embed="rId3"/>
+          <a:stretch>
+            <a:fillRect/>
+          </a:stretch>
+        </p:blipFill>
+        <p:spPr>
+          <a:xfrm>
+            <a:off x="315498" y="173831"/>
+            <a:ext cx="2324177" cy="1316348"/>
+          </a:xfrm>
+          <a:prstGeom prst="rect">
+            <a:avLst/>
+          </a:prstGeom>
+        </p:spPr>
+      </p:pic>
+      <p:cxnSp>
+        <p:nvCxnSpPr>
+          <p:cNvPr id="24" name="Straight Arrow Connector 23">
+            <a:extLst>
+              <a:ext uri="{FF2B5EF4-FFF2-40B4-BE49-F238E27FC236}">
+                <a16:creationId xmlns:a16="http://schemas.microsoft.com/office/drawing/2014/main" id="{E0CE7A5D-9374-BD5A-B581-95CCC784533E}"/>
+              </a:ext>
+            </a:extLst>
+          </p:cNvPr>
+          <p:cNvCxnSpPr>
+            <a:cxnSpLocks/>
+            <a:stCxn id="18" idx="2"/>
+          </p:cNvCxnSpPr>
+          <p:nvPr/>
+        </p:nvCxnSpPr>
+        <p:spPr>
+          <a:xfrm>
+            <a:off x="1477587" y="1490179"/>
+            <a:ext cx="0" cy="366312"/>
+          </a:xfrm>
+          <a:prstGeom prst="straightConnector1">
+            <a:avLst/>
+          </a:prstGeom>
+          <a:ln>
+            <a:solidFill>
+              <a:srgbClr val="FFC000"/>
+            </a:solidFill>
+            <a:tailEnd type="triangle"/>
+          </a:ln>
+        </p:spPr>
+        <p:style>
+          <a:lnRef idx="2">
+            <a:schemeClr val="accent1"/>
+          </a:lnRef>
+          <a:fillRef idx="0">
+            <a:schemeClr val="accent1"/>
+          </a:fillRef>
+          <a:effectRef idx="1">
+            <a:schemeClr val="accent1"/>
+          </a:effectRef>
+          <a:fontRef idx="minor">
+            <a:schemeClr val="tx1"/>
+          </a:fontRef>
+        </p:style>
+      </p:cxnSp>
+      <p:pic>
+        <p:nvPicPr>
+          <p:cNvPr id="8" name="Picture 7" descr="A diagram of a diagram&#10;&#10;Description automatically generated">
+            <a:extLst>
+              <a:ext uri="{FF2B5EF4-FFF2-40B4-BE49-F238E27FC236}">
+                <a16:creationId xmlns:a16="http://schemas.microsoft.com/office/drawing/2014/main" id="{EFB4C66C-91B3-A599-0610-5ACEEAD20455}"/>
+              </a:ext>
+            </a:extLst>
+          </p:cNvPr>
+          <p:cNvPicPr>
+            <a:picLocks noChangeAspect="1"/>
+          </p:cNvPicPr>
+          <p:nvPr/>
+        </p:nvPicPr>
+        <p:blipFill>
+          <a:blip r:embed="rId4"/>
+          <a:stretch>
+            <a:fillRect/>
+          </a:stretch>
+        </p:blipFill>
+        <p:spPr>
+          <a:xfrm>
+            <a:off x="315498" y="1856491"/>
+            <a:ext cx="4667975" cy="1222818"/>
+          </a:xfrm>
+          <a:prstGeom prst="rect">
+            <a:avLst/>
+          </a:prstGeom>
+        </p:spPr>
+      </p:pic>
+      <p:pic>
+        <p:nvPicPr>
+          <p:cNvPr id="10" name="Picture 9" descr="A screenshot of a computer&#10;&#10;Description automatically generated">
+            <a:extLst>
+              <a:ext uri="{FF2B5EF4-FFF2-40B4-BE49-F238E27FC236}">
+                <a16:creationId xmlns:a16="http://schemas.microsoft.com/office/drawing/2014/main" id="{AF3BB0F1-65E4-05DF-1E8A-B3B24352DB81}"/>
+              </a:ext>
+            </a:extLst>
+          </p:cNvPr>
+          <p:cNvPicPr>
+            <a:picLocks noChangeAspect="1"/>
+          </p:cNvPicPr>
+          <p:nvPr/>
+        </p:nvPicPr>
+        <p:blipFill>
+          <a:blip r:embed="rId5"/>
+          <a:stretch>
+            <a:fillRect/>
+          </a:stretch>
+        </p:blipFill>
+        <p:spPr>
+          <a:xfrm>
+            <a:off x="6683247" y="605957"/>
+            <a:ext cx="4640067" cy="2501068"/>
+          </a:xfrm>
+          <a:prstGeom prst="rect">
+            <a:avLst/>
+          </a:prstGeom>
+        </p:spPr>
+      </p:pic>
+      <p:pic>
+        <p:nvPicPr>
+          <p:cNvPr id="13" name="Picture 12" descr="A screenshot of a computer&#10;&#10;Description automatically generated">
+            <a:extLst>
+              <a:ext uri="{FF2B5EF4-FFF2-40B4-BE49-F238E27FC236}">
+                <a16:creationId xmlns:a16="http://schemas.microsoft.com/office/drawing/2014/main" id="{0A8269DE-7D91-FEAF-3B29-9638AD7148AC}"/>
+              </a:ext>
+            </a:extLst>
+          </p:cNvPr>
+          <p:cNvPicPr>
+            <a:picLocks noChangeAspect="1"/>
+          </p:cNvPicPr>
+          <p:nvPr/>
+        </p:nvPicPr>
+        <p:blipFill>
+          <a:blip r:embed="rId6"/>
+          <a:stretch>
+            <a:fillRect/>
+          </a:stretch>
+        </p:blipFill>
+        <p:spPr>
+          <a:xfrm>
+            <a:off x="355101" y="3635473"/>
+            <a:ext cx="4029612" cy="2868217"/>
+          </a:xfrm>
+          <a:prstGeom prst="rect">
+            <a:avLst/>
+          </a:prstGeom>
+        </p:spPr>
+      </p:pic>
+      <p:pic>
+        <p:nvPicPr>
+          <p:cNvPr id="17" name="Picture 16" descr="A screenshot of a computer&#10;&#10;Description automatically generated">
+            <a:extLst>
+              <a:ext uri="{FF2B5EF4-FFF2-40B4-BE49-F238E27FC236}">
+                <a16:creationId xmlns:a16="http://schemas.microsoft.com/office/drawing/2014/main" id="{F0031E85-CBEF-7961-8CBE-48083291D0F9}"/>
+              </a:ext>
+            </a:extLst>
+          </p:cNvPr>
+          <p:cNvPicPr>
+            <a:picLocks noChangeAspect="1"/>
+          </p:cNvPicPr>
+          <p:nvPr/>
+        </p:nvPicPr>
+        <p:blipFill>
+          <a:blip r:embed="rId7"/>
+          <a:stretch>
+            <a:fillRect/>
+          </a:stretch>
+        </p:blipFill>
+        <p:spPr>
+          <a:xfrm>
+            <a:off x="4983473" y="3923780"/>
+            <a:ext cx="5085473" cy="2291602"/>
+          </a:xfrm>
+          <a:prstGeom prst="rect">
+            <a:avLst/>
+          </a:prstGeom>
+        </p:spPr>
+      </p:pic>
+      <p:sp>
+        <p:nvSpPr>
+          <p:cNvPr id="19" name="Oval 18">
+            <a:extLst>
+              <a:ext uri="{FF2B5EF4-FFF2-40B4-BE49-F238E27FC236}">
+                <a16:creationId xmlns:a16="http://schemas.microsoft.com/office/drawing/2014/main" id="{DB143187-681B-DF13-912C-92A75C1AF8ED}"/>
+              </a:ext>
+            </a:extLst>
+          </p:cNvPr>
+          <p:cNvSpPr/>
+          <p:nvPr/>
+        </p:nvSpPr>
+        <p:spPr>
+          <a:xfrm>
+            <a:off x="11054783" y="453633"/>
+            <a:ext cx="378372" cy="378372"/>
+          </a:xfrm>
+          <a:prstGeom prst="ellipse">
+            <a:avLst/>
+          </a:prstGeom>
+        </p:spPr>
+        <p:style>
+          <a:lnRef idx="2">
+            <a:schemeClr val="accent1">
+              <a:shade val="15000"/>
+            </a:schemeClr>
+          </a:lnRef>
+          <a:fillRef idx="1">
+            <a:schemeClr val="accent1"/>
+          </a:fillRef>
+          <a:effectRef idx="0">
+            <a:schemeClr val="accent1"/>
+          </a:effectRef>
+          <a:fontRef idx="minor">
+            <a:schemeClr val="lt1"/>
+          </a:fontRef>
+        </p:style>
+        <p:txBody>
+          <a:bodyPr rtlCol="0" anchor="ctr"/>
+          <a:lstStyle/>
+          <a:p>
+            <a:pPr algn="ctr"/>
+            <a:r>
+              <a:rPr lang="en-NL" dirty="0"/>
+              <a:t>1</a:t>
+            </a:r>
+          </a:p>
+        </p:txBody>
+      </p:sp>
+      <p:sp>
+        <p:nvSpPr>
+          <p:cNvPr id="21" name="Oval 20">
+            <a:extLst>
+              <a:ext uri="{FF2B5EF4-FFF2-40B4-BE49-F238E27FC236}">
+                <a16:creationId xmlns:a16="http://schemas.microsoft.com/office/drawing/2014/main" id="{5B12809E-1459-3C94-D7D6-9D50202BC520}"/>
+              </a:ext>
+            </a:extLst>
+          </p:cNvPr>
+          <p:cNvSpPr/>
+          <p:nvPr/>
+        </p:nvSpPr>
+        <p:spPr>
+          <a:xfrm>
+            <a:off x="4116535" y="3446287"/>
+            <a:ext cx="378372" cy="378372"/>
+          </a:xfrm>
+          <a:prstGeom prst="ellipse">
+            <a:avLst/>
+          </a:prstGeom>
+        </p:spPr>
+        <p:style>
+          <a:lnRef idx="2">
+            <a:schemeClr val="accent1">
+              <a:shade val="15000"/>
+            </a:schemeClr>
+          </a:lnRef>
+          <a:fillRef idx="1">
+            <a:schemeClr val="accent1"/>
+          </a:fillRef>
+          <a:effectRef idx="0">
+            <a:schemeClr val="accent1"/>
+          </a:effectRef>
+          <a:fontRef idx="minor">
+            <a:schemeClr val="lt1"/>
+          </a:fontRef>
+        </p:style>
+        <p:txBody>
+          <a:bodyPr rtlCol="0" anchor="ctr"/>
+          <a:lstStyle/>
+          <a:p>
+            <a:pPr algn="ctr"/>
+            <a:r>
+              <a:rPr lang="en-NL" dirty="0"/>
+              <a:t>2</a:t>
+            </a:r>
+          </a:p>
+        </p:txBody>
+      </p:sp>
+      <p:sp>
+        <p:nvSpPr>
+          <p:cNvPr id="23" name="Oval 22">
+            <a:extLst>
+              <a:ext uri="{FF2B5EF4-FFF2-40B4-BE49-F238E27FC236}">
+                <a16:creationId xmlns:a16="http://schemas.microsoft.com/office/drawing/2014/main" id="{CB38E11D-854A-BD1B-3EED-B95D3A229897}"/>
+              </a:ext>
+            </a:extLst>
+          </p:cNvPr>
+          <p:cNvSpPr/>
+          <p:nvPr/>
+        </p:nvSpPr>
+        <p:spPr>
+          <a:xfrm>
+            <a:off x="9879760" y="3762310"/>
+            <a:ext cx="378372" cy="378372"/>
+          </a:xfrm>
+          <a:prstGeom prst="ellipse">
+            <a:avLst/>
+          </a:prstGeom>
+        </p:spPr>
+        <p:style>
+          <a:lnRef idx="2">
+            <a:schemeClr val="accent1">
+              <a:shade val="15000"/>
+            </a:schemeClr>
+          </a:lnRef>
+          <a:fillRef idx="1">
+            <a:schemeClr val="accent1"/>
+          </a:fillRef>
+          <a:effectRef idx="0">
+            <a:schemeClr val="accent1"/>
+          </a:effectRef>
+          <a:fontRef idx="minor">
+            <a:schemeClr val="lt1"/>
+          </a:fontRef>
+        </p:style>
+        <p:txBody>
+          <a:bodyPr rtlCol="0" anchor="ctr"/>
+          <a:lstStyle/>
+          <a:p>
+            <a:pPr algn="ctr"/>
+            <a:r>
+              <a:rPr lang="en-NL" dirty="0"/>
+              <a:t>3</a:t>
+            </a:r>
+          </a:p>
+        </p:txBody>
+      </p:sp>
+    </p:spTree>
+    <p:extLst>
+      <p:ext uri="{BB962C8B-B14F-4D97-AF65-F5344CB8AC3E}">
+        <p14:creationId xmlns:p14="http://schemas.microsoft.com/office/powerpoint/2010/main" val="1447528563"/>
+      </p:ext>
+    </p:extLst>
+  </p:cSld>
+  <p:clrMapOvr>
+    <a:masterClrMapping/>
+  </p:clrMapOvr>
+</p:sld>
+</file>
+
+<file path=ppt/slides/slide19.xml><?xml version="1.0" encoding="utf-8"?>
+<p:sld xmlns:a="http://schemas.openxmlformats.org/drawingml/2006/main" xmlns:r="http://schemas.openxmlformats.org/officeDocument/2006/relationships" xmlns:p="http://schemas.openxmlformats.org/presentationml/2006/main">
+  <p:cSld>
+    <p:spTree>
+      <p:nvGrpSpPr>
+        <p:cNvPr id="1" name=""/>
+        <p:cNvGrpSpPr/>
+        <p:nvPr/>
+      </p:nvGrpSpPr>
+      <p:grpSpPr>
+        <a:xfrm>
+          <a:off x="0" y="0"/>
+          <a:ext cx="0" cy="0"/>
+          <a:chOff x="0" y="0"/>
+          <a:chExt cx="0" cy="0"/>
+        </a:xfrm>
+      </p:grpSpPr>
+      <p:pic>
+        <p:nvPicPr>
+          <p:cNvPr id="18" name="Picture 17" descr="A screenshot of a computer&#10;&#10;Description automatically generated">
+            <a:extLst>
+              <a:ext uri="{FF2B5EF4-FFF2-40B4-BE49-F238E27FC236}">
+                <a16:creationId xmlns:a16="http://schemas.microsoft.com/office/drawing/2014/main" id="{CDCF9F0F-ECB0-286A-0678-5287551DDE5C}"/>
+              </a:ext>
+            </a:extLst>
+          </p:cNvPr>
+          <p:cNvPicPr>
+            <a:picLocks noChangeAspect="1"/>
+          </p:cNvPicPr>
+          <p:nvPr/>
+        </p:nvPicPr>
+        <p:blipFill>
+          <a:blip r:embed="rId3"/>
+          <a:stretch>
+            <a:fillRect/>
+          </a:stretch>
+        </p:blipFill>
+        <p:spPr>
+          <a:xfrm>
+            <a:off x="315498" y="173831"/>
+            <a:ext cx="2324177" cy="1316348"/>
+          </a:xfrm>
+          <a:prstGeom prst="rect">
+            <a:avLst/>
+          </a:prstGeom>
+        </p:spPr>
+      </p:pic>
+      <p:cxnSp>
+        <p:nvCxnSpPr>
+          <p:cNvPr id="24" name="Straight Arrow Connector 23">
+            <a:extLst>
+              <a:ext uri="{FF2B5EF4-FFF2-40B4-BE49-F238E27FC236}">
+                <a16:creationId xmlns:a16="http://schemas.microsoft.com/office/drawing/2014/main" id="{E0CE7A5D-9374-BD5A-B581-95CCC784533E}"/>
+              </a:ext>
+            </a:extLst>
+          </p:cNvPr>
+          <p:cNvCxnSpPr>
+            <a:cxnSpLocks/>
+            <a:stCxn id="18" idx="2"/>
+          </p:cNvCxnSpPr>
+          <p:nvPr/>
+        </p:nvCxnSpPr>
+        <p:spPr>
+          <a:xfrm>
+            <a:off x="1477587" y="1490179"/>
+            <a:ext cx="0" cy="366312"/>
+          </a:xfrm>
+          <a:prstGeom prst="straightConnector1">
+            <a:avLst/>
+          </a:prstGeom>
+          <a:ln>
+            <a:solidFill>
+              <a:srgbClr val="FFC000"/>
+            </a:solidFill>
+            <a:tailEnd type="triangle"/>
+          </a:ln>
+        </p:spPr>
+        <p:style>
+          <a:lnRef idx="2">
+            <a:schemeClr val="accent1"/>
+          </a:lnRef>
+          <a:fillRef idx="0">
+            <a:schemeClr val="accent1"/>
+          </a:fillRef>
+          <a:effectRef idx="1">
+            <a:schemeClr val="accent1"/>
+          </a:effectRef>
+          <a:fontRef idx="minor">
+            <a:schemeClr val="tx1"/>
+          </a:fontRef>
+        </p:style>
+      </p:cxnSp>
+      <p:pic>
+        <p:nvPicPr>
+          <p:cNvPr id="3" name="Picture 2" descr="A white background with black text&#10;&#10;Description automatically generated">
+            <a:extLst>
+              <a:ext uri="{FF2B5EF4-FFF2-40B4-BE49-F238E27FC236}">
+                <a16:creationId xmlns:a16="http://schemas.microsoft.com/office/drawing/2014/main" id="{5BD3EC52-07C2-9D5C-C5D6-DEA747A5031F}"/>
+              </a:ext>
+            </a:extLst>
+          </p:cNvPr>
+          <p:cNvPicPr>
+            <a:picLocks noChangeAspect="1"/>
+          </p:cNvPicPr>
+          <p:nvPr/>
+        </p:nvPicPr>
+        <p:blipFill>
+          <a:blip r:embed="rId4"/>
+          <a:stretch>
+            <a:fillRect/>
+          </a:stretch>
+        </p:blipFill>
+        <p:spPr>
+          <a:xfrm>
+            <a:off x="315498" y="1856492"/>
+            <a:ext cx="7688405" cy="1316348"/>
+          </a:xfrm>
+          <a:prstGeom prst="rect">
+            <a:avLst/>
+          </a:prstGeom>
+        </p:spPr>
+      </p:pic>
+      <p:pic>
+        <p:nvPicPr>
+          <p:cNvPr id="5" name="Picture 4" descr="A screenshot of a computer&#10;&#10;Description automatically generated">
+            <a:extLst>
+              <a:ext uri="{FF2B5EF4-FFF2-40B4-BE49-F238E27FC236}">
+                <a16:creationId xmlns:a16="http://schemas.microsoft.com/office/drawing/2014/main" id="{13E0C76C-A8CA-CE7B-2F0C-C03A2888E547}"/>
+              </a:ext>
+            </a:extLst>
+          </p:cNvPr>
+          <p:cNvPicPr>
+            <a:picLocks noChangeAspect="1"/>
+          </p:cNvPicPr>
+          <p:nvPr/>
+        </p:nvPicPr>
+        <p:blipFill>
+          <a:blip r:embed="rId5"/>
+          <a:stretch>
+            <a:fillRect/>
+          </a:stretch>
+        </p:blipFill>
+        <p:spPr>
+          <a:xfrm>
+            <a:off x="4289234" y="4004649"/>
+            <a:ext cx="4827309" cy="2246671"/>
+          </a:xfrm>
+          <a:prstGeom prst="rect">
+            <a:avLst/>
+          </a:prstGeom>
+        </p:spPr>
+      </p:pic>
+      <p:cxnSp>
+        <p:nvCxnSpPr>
+          <p:cNvPr id="7" name="Straight Arrow Connector 6">
+            <a:extLst>
+              <a:ext uri="{FF2B5EF4-FFF2-40B4-BE49-F238E27FC236}">
+                <a16:creationId xmlns:a16="http://schemas.microsoft.com/office/drawing/2014/main" id="{B4EE5D26-ED06-681F-2B39-12A17DD8A68E}"/>
+              </a:ext>
+            </a:extLst>
+          </p:cNvPr>
+          <p:cNvCxnSpPr>
+            <a:cxnSpLocks/>
+            <a:endCxn id="5" idx="0"/>
+          </p:cNvCxnSpPr>
+          <p:nvPr/>
+        </p:nvCxnSpPr>
+        <p:spPr>
+          <a:xfrm>
+            <a:off x="6702889" y="3172840"/>
+            <a:ext cx="0" cy="831809"/>
+          </a:xfrm>
+          <a:prstGeom prst="straightConnector1">
+            <a:avLst/>
+          </a:prstGeom>
+          <a:ln>
+            <a:solidFill>
+              <a:srgbClr val="FFC000"/>
+            </a:solidFill>
+            <a:tailEnd type="triangle"/>
+          </a:ln>
+        </p:spPr>
+        <p:style>
+          <a:lnRef idx="2">
+            <a:schemeClr val="accent1"/>
+          </a:lnRef>
+          <a:fillRef idx="0">
+            <a:schemeClr val="accent1"/>
+          </a:fillRef>
+          <a:effectRef idx="1">
+            <a:schemeClr val="accent1"/>
+          </a:effectRef>
+          <a:fontRef idx="minor">
+            <a:schemeClr val="tx1"/>
+          </a:fontRef>
+        </p:style>
+      </p:cxnSp>
+    </p:spTree>
+    <p:extLst>
+      <p:ext uri="{BB962C8B-B14F-4D97-AF65-F5344CB8AC3E}">
+        <p14:creationId xmlns:p14="http://schemas.microsoft.com/office/powerpoint/2010/main" val="1663194424"/>
       </p:ext>
     </p:extLst>
   </p:cSld>
@@ -5578,6 +7285,424 @@
     <p:extLst>
       <p:ext uri="{BB962C8B-B14F-4D97-AF65-F5344CB8AC3E}">
         <p14:creationId xmlns:p14="http://schemas.microsoft.com/office/powerpoint/2010/main" val="1946434606"/>
+      </p:ext>
+    </p:extLst>
+  </p:cSld>
+  <p:clrMapOvr>
+    <a:masterClrMapping/>
+  </p:clrMapOvr>
+</p:sld>
+</file>
+
+<file path=ppt/slides/slide20.xml><?xml version="1.0" encoding="utf-8"?>
+<p:sld xmlns:a="http://schemas.openxmlformats.org/drawingml/2006/main" xmlns:r="http://schemas.openxmlformats.org/officeDocument/2006/relationships" xmlns:p="http://schemas.openxmlformats.org/presentationml/2006/main">
+  <p:cSld>
+    <p:spTree>
+      <p:nvGrpSpPr>
+        <p:cNvPr id="1" name=""/>
+        <p:cNvGrpSpPr/>
+        <p:nvPr/>
+      </p:nvGrpSpPr>
+      <p:grpSpPr>
+        <a:xfrm>
+          <a:off x="0" y="0"/>
+          <a:ext cx="0" cy="0"/>
+          <a:chOff x="0" y="0"/>
+          <a:chExt cx="0" cy="0"/>
+        </a:xfrm>
+      </p:grpSpPr>
+      <p:pic>
+        <p:nvPicPr>
+          <p:cNvPr id="18" name="Picture 17" descr="A screenshot of a computer&#10;&#10;Description automatically generated">
+            <a:extLst>
+              <a:ext uri="{FF2B5EF4-FFF2-40B4-BE49-F238E27FC236}">
+                <a16:creationId xmlns:a16="http://schemas.microsoft.com/office/drawing/2014/main" id="{CDCF9F0F-ECB0-286A-0678-5287551DDE5C}"/>
+              </a:ext>
+            </a:extLst>
+          </p:cNvPr>
+          <p:cNvPicPr>
+            <a:picLocks noChangeAspect="1"/>
+          </p:cNvPicPr>
+          <p:nvPr/>
+        </p:nvPicPr>
+        <p:blipFill>
+          <a:blip r:embed="rId3"/>
+          <a:stretch>
+            <a:fillRect/>
+          </a:stretch>
+        </p:blipFill>
+        <p:spPr>
+          <a:xfrm>
+            <a:off x="315498" y="173831"/>
+            <a:ext cx="2324177" cy="1316348"/>
+          </a:xfrm>
+          <a:prstGeom prst="rect">
+            <a:avLst/>
+          </a:prstGeom>
+        </p:spPr>
+      </p:pic>
+      <p:cxnSp>
+        <p:nvCxnSpPr>
+          <p:cNvPr id="24" name="Straight Arrow Connector 23">
+            <a:extLst>
+              <a:ext uri="{FF2B5EF4-FFF2-40B4-BE49-F238E27FC236}">
+                <a16:creationId xmlns:a16="http://schemas.microsoft.com/office/drawing/2014/main" id="{E0CE7A5D-9374-BD5A-B581-95CCC784533E}"/>
+              </a:ext>
+            </a:extLst>
+          </p:cNvPr>
+          <p:cNvCxnSpPr>
+            <a:cxnSpLocks/>
+            <a:stCxn id="18" idx="2"/>
+          </p:cNvCxnSpPr>
+          <p:nvPr/>
+        </p:nvCxnSpPr>
+        <p:spPr>
+          <a:xfrm>
+            <a:off x="1477587" y="1490179"/>
+            <a:ext cx="0" cy="366312"/>
+          </a:xfrm>
+          <a:prstGeom prst="straightConnector1">
+            <a:avLst/>
+          </a:prstGeom>
+          <a:ln>
+            <a:solidFill>
+              <a:srgbClr val="FFC000"/>
+            </a:solidFill>
+            <a:tailEnd type="triangle"/>
+          </a:ln>
+        </p:spPr>
+        <p:style>
+          <a:lnRef idx="2">
+            <a:schemeClr val="accent1"/>
+          </a:lnRef>
+          <a:fillRef idx="0">
+            <a:schemeClr val="accent1"/>
+          </a:fillRef>
+          <a:effectRef idx="1">
+            <a:schemeClr val="accent1"/>
+          </a:effectRef>
+          <a:fontRef idx="minor">
+            <a:schemeClr val="tx1"/>
+          </a:fontRef>
+        </p:style>
+      </p:cxnSp>
+      <p:pic>
+        <p:nvPicPr>
+          <p:cNvPr id="3" name="Picture 2" descr="A diagram of a funnel&#10;&#10;Description automatically generated">
+            <a:extLst>
+              <a:ext uri="{FF2B5EF4-FFF2-40B4-BE49-F238E27FC236}">
+                <a16:creationId xmlns:a16="http://schemas.microsoft.com/office/drawing/2014/main" id="{2D133C5B-E85E-AF84-78BB-B366B0788226}"/>
+              </a:ext>
+            </a:extLst>
+          </p:cNvPr>
+          <p:cNvPicPr>
+            <a:picLocks noChangeAspect="1"/>
+          </p:cNvPicPr>
+          <p:nvPr/>
+        </p:nvPicPr>
+        <p:blipFill>
+          <a:blip r:embed="rId4"/>
+          <a:stretch>
+            <a:fillRect/>
+          </a:stretch>
+        </p:blipFill>
+        <p:spPr>
+          <a:xfrm>
+            <a:off x="315498" y="1856491"/>
+            <a:ext cx="9199106" cy="1182893"/>
+          </a:xfrm>
+          <a:prstGeom prst="rect">
+            <a:avLst/>
+          </a:prstGeom>
+        </p:spPr>
+      </p:pic>
+      <p:pic>
+        <p:nvPicPr>
+          <p:cNvPr id="5" name="Picture 4" descr="A screenshot of a computer&#10;&#10;Description automatically generated">
+            <a:extLst>
+              <a:ext uri="{FF2B5EF4-FFF2-40B4-BE49-F238E27FC236}">
+                <a16:creationId xmlns:a16="http://schemas.microsoft.com/office/drawing/2014/main" id="{8C8D4DEC-E87C-2EAA-8740-49BBA816739C}"/>
+              </a:ext>
+            </a:extLst>
+          </p:cNvPr>
+          <p:cNvPicPr>
+            <a:picLocks noChangeAspect="1"/>
+          </p:cNvPicPr>
+          <p:nvPr/>
+        </p:nvPicPr>
+        <p:blipFill>
+          <a:blip r:embed="rId5"/>
+          <a:stretch>
+            <a:fillRect/>
+          </a:stretch>
+        </p:blipFill>
+        <p:spPr>
+          <a:xfrm>
+            <a:off x="4829670" y="3429000"/>
+            <a:ext cx="6892277" cy="3008533"/>
+          </a:xfrm>
+          <a:prstGeom prst="rect">
+            <a:avLst/>
+          </a:prstGeom>
+        </p:spPr>
+      </p:pic>
+      <p:cxnSp>
+        <p:nvCxnSpPr>
+          <p:cNvPr id="7" name="Straight Arrow Connector 6">
+            <a:extLst>
+              <a:ext uri="{FF2B5EF4-FFF2-40B4-BE49-F238E27FC236}">
+                <a16:creationId xmlns:a16="http://schemas.microsoft.com/office/drawing/2014/main" id="{272C4629-970D-17F9-D7F3-3993D69FB48E}"/>
+              </a:ext>
+            </a:extLst>
+          </p:cNvPr>
+          <p:cNvCxnSpPr>
+            <a:endCxn id="5" idx="0"/>
+          </p:cNvCxnSpPr>
+          <p:nvPr/>
+        </p:nvCxnSpPr>
+        <p:spPr>
+          <a:xfrm>
+            <a:off x="8275808" y="3039384"/>
+            <a:ext cx="1" cy="389616"/>
+          </a:xfrm>
+          <a:prstGeom prst="straightConnector1">
+            <a:avLst/>
+          </a:prstGeom>
+          <a:ln>
+            <a:solidFill>
+              <a:srgbClr val="FFC000"/>
+            </a:solidFill>
+            <a:tailEnd type="triangle"/>
+          </a:ln>
+        </p:spPr>
+        <p:style>
+          <a:lnRef idx="2">
+            <a:schemeClr val="accent1"/>
+          </a:lnRef>
+          <a:fillRef idx="0">
+            <a:schemeClr val="accent1"/>
+          </a:fillRef>
+          <a:effectRef idx="1">
+            <a:schemeClr val="accent1"/>
+          </a:effectRef>
+          <a:fontRef idx="minor">
+            <a:schemeClr val="tx1"/>
+          </a:fontRef>
+        </p:style>
+      </p:cxnSp>
+    </p:spTree>
+    <p:extLst>
+      <p:ext uri="{BB962C8B-B14F-4D97-AF65-F5344CB8AC3E}">
+        <p14:creationId xmlns:p14="http://schemas.microsoft.com/office/powerpoint/2010/main" val="2922206871"/>
+      </p:ext>
+    </p:extLst>
+  </p:cSld>
+  <p:clrMapOvr>
+    <a:masterClrMapping/>
+  </p:clrMapOvr>
+</p:sld>
+</file>
+
+<file path=ppt/slides/slide21.xml><?xml version="1.0" encoding="utf-8"?>
+<p:sld xmlns:a="http://schemas.openxmlformats.org/drawingml/2006/main" xmlns:r="http://schemas.openxmlformats.org/officeDocument/2006/relationships" xmlns:p="http://schemas.openxmlformats.org/presentationml/2006/main">
+  <p:cSld>
+    <p:spTree>
+      <p:nvGrpSpPr>
+        <p:cNvPr id="1" name=""/>
+        <p:cNvGrpSpPr/>
+        <p:nvPr/>
+      </p:nvGrpSpPr>
+      <p:grpSpPr>
+        <a:xfrm>
+          <a:off x="0" y="0"/>
+          <a:ext cx="0" cy="0"/>
+          <a:chOff x="0" y="0"/>
+          <a:chExt cx="0" cy="0"/>
+        </a:xfrm>
+      </p:grpSpPr>
+      <p:pic>
+        <p:nvPicPr>
+          <p:cNvPr id="18" name="Picture 17" descr="A screenshot of a computer&#10;&#10;Description automatically generated">
+            <a:extLst>
+              <a:ext uri="{FF2B5EF4-FFF2-40B4-BE49-F238E27FC236}">
+                <a16:creationId xmlns:a16="http://schemas.microsoft.com/office/drawing/2014/main" id="{CDCF9F0F-ECB0-286A-0678-5287551DDE5C}"/>
+              </a:ext>
+            </a:extLst>
+          </p:cNvPr>
+          <p:cNvPicPr>
+            <a:picLocks noChangeAspect="1"/>
+          </p:cNvPicPr>
+          <p:nvPr/>
+        </p:nvPicPr>
+        <p:blipFill>
+          <a:blip r:embed="rId3"/>
+          <a:stretch>
+            <a:fillRect/>
+          </a:stretch>
+        </p:blipFill>
+        <p:spPr>
+          <a:xfrm>
+            <a:off x="315498" y="173831"/>
+            <a:ext cx="2324177" cy="1316348"/>
+          </a:xfrm>
+          <a:prstGeom prst="rect">
+            <a:avLst/>
+          </a:prstGeom>
+        </p:spPr>
+      </p:pic>
+      <p:cxnSp>
+        <p:nvCxnSpPr>
+          <p:cNvPr id="24" name="Straight Arrow Connector 23">
+            <a:extLst>
+              <a:ext uri="{FF2B5EF4-FFF2-40B4-BE49-F238E27FC236}">
+                <a16:creationId xmlns:a16="http://schemas.microsoft.com/office/drawing/2014/main" id="{E0CE7A5D-9374-BD5A-B581-95CCC784533E}"/>
+              </a:ext>
+            </a:extLst>
+          </p:cNvPr>
+          <p:cNvCxnSpPr>
+            <a:cxnSpLocks/>
+            <a:stCxn id="18" idx="2"/>
+          </p:cNvCxnSpPr>
+          <p:nvPr/>
+        </p:nvCxnSpPr>
+        <p:spPr>
+          <a:xfrm>
+            <a:off x="1477587" y="1490179"/>
+            <a:ext cx="0" cy="366312"/>
+          </a:xfrm>
+          <a:prstGeom prst="straightConnector1">
+            <a:avLst/>
+          </a:prstGeom>
+          <a:ln>
+            <a:solidFill>
+              <a:srgbClr val="FFC000"/>
+            </a:solidFill>
+            <a:tailEnd type="triangle"/>
+          </a:ln>
+        </p:spPr>
+        <p:style>
+          <a:lnRef idx="2">
+            <a:schemeClr val="accent1"/>
+          </a:lnRef>
+          <a:fillRef idx="0">
+            <a:schemeClr val="accent1"/>
+          </a:fillRef>
+          <a:effectRef idx="1">
+            <a:schemeClr val="accent1"/>
+          </a:effectRef>
+          <a:fontRef idx="minor">
+            <a:schemeClr val="tx1"/>
+          </a:fontRef>
+        </p:style>
+      </p:cxnSp>
+      <p:cxnSp>
+        <p:nvCxnSpPr>
+          <p:cNvPr id="7" name="Straight Arrow Connector 6">
+            <a:extLst>
+              <a:ext uri="{FF2B5EF4-FFF2-40B4-BE49-F238E27FC236}">
+                <a16:creationId xmlns:a16="http://schemas.microsoft.com/office/drawing/2014/main" id="{272C4629-970D-17F9-D7F3-3993D69FB48E}"/>
+              </a:ext>
+            </a:extLst>
+          </p:cNvPr>
+          <p:cNvCxnSpPr>
+            <a:cxnSpLocks/>
+          </p:cNvCxnSpPr>
+          <p:nvPr/>
+        </p:nvCxnSpPr>
+        <p:spPr>
+          <a:xfrm>
+            <a:off x="10115624" y="3039384"/>
+            <a:ext cx="1" cy="389616"/>
+          </a:xfrm>
+          <a:prstGeom prst="straightConnector1">
+            <a:avLst/>
+          </a:prstGeom>
+          <a:ln>
+            <a:solidFill>
+              <a:srgbClr val="FFC000"/>
+            </a:solidFill>
+            <a:tailEnd type="triangle"/>
+          </a:ln>
+        </p:spPr>
+        <p:style>
+          <a:lnRef idx="2">
+            <a:schemeClr val="accent1"/>
+          </a:lnRef>
+          <a:fillRef idx="0">
+            <a:schemeClr val="accent1"/>
+          </a:fillRef>
+          <a:effectRef idx="1">
+            <a:schemeClr val="accent1"/>
+          </a:effectRef>
+          <a:fontRef idx="minor">
+            <a:schemeClr val="tx1"/>
+          </a:fontRef>
+        </p:style>
+      </p:cxnSp>
+      <p:pic>
+        <p:nvPicPr>
+          <p:cNvPr id="4" name="Picture 3">
+            <a:extLst>
+              <a:ext uri="{FF2B5EF4-FFF2-40B4-BE49-F238E27FC236}">
+                <a16:creationId xmlns:a16="http://schemas.microsoft.com/office/drawing/2014/main" id="{0928CDD8-33BF-D44F-DC40-E38A796E780E}"/>
+              </a:ext>
+            </a:extLst>
+          </p:cNvPr>
+          <p:cNvPicPr>
+            <a:picLocks noChangeAspect="1"/>
+          </p:cNvPicPr>
+          <p:nvPr/>
+        </p:nvPicPr>
+        <p:blipFill>
+          <a:blip r:embed="rId4"/>
+          <a:stretch>
+            <a:fillRect/>
+          </a:stretch>
+        </p:blipFill>
+        <p:spPr>
+          <a:xfrm>
+            <a:off x="414649" y="1892296"/>
+            <a:ext cx="10758907" cy="1147088"/>
+          </a:xfrm>
+          <a:prstGeom prst="rect">
+            <a:avLst/>
+          </a:prstGeom>
+        </p:spPr>
+      </p:pic>
+      <p:pic>
+        <p:nvPicPr>
+          <p:cNvPr id="8" name="Picture 7" descr="A screenshot of a computer&#10;&#10;Description automatically generated">
+            <a:extLst>
+              <a:ext uri="{FF2B5EF4-FFF2-40B4-BE49-F238E27FC236}">
+                <a16:creationId xmlns:a16="http://schemas.microsoft.com/office/drawing/2014/main" id="{AED39A64-1287-5A9E-0E3D-DAC478522D22}"/>
+              </a:ext>
+            </a:extLst>
+          </p:cNvPr>
+          <p:cNvPicPr>
+            <a:picLocks noChangeAspect="1"/>
+          </p:cNvPicPr>
+          <p:nvPr/>
+        </p:nvPicPr>
+        <p:blipFill>
+          <a:blip r:embed="rId5"/>
+          <a:stretch>
+            <a:fillRect/>
+          </a:stretch>
+        </p:blipFill>
+        <p:spPr>
+          <a:xfrm>
+            <a:off x="5368294" y="3537898"/>
+            <a:ext cx="5805262" cy="2547058"/>
+          </a:xfrm>
+          <a:prstGeom prst="rect">
+            <a:avLst/>
+          </a:prstGeom>
+        </p:spPr>
+      </p:pic>
+    </p:spTree>
+    <p:extLst>
+      <p:ext uri="{BB962C8B-B14F-4D97-AF65-F5344CB8AC3E}">
+        <p14:creationId xmlns:p14="http://schemas.microsoft.com/office/powerpoint/2010/main" val="2166512358"/>
       </p:ext>
     </p:extLst>
   </p:cSld>

</xml_diff>